<commit_message>
Everyday we stray further from god
</commit_message>
<xml_diff>
--- a/Angebot für mintBerryCrunchGames GmbH.pptx
+++ b/Angebot für mintBerryCrunchGames GmbH.pptx
@@ -5,10 +5,10 @@
     <p:sldMasterId id="2147483690" r:id="rId4"/>
   </p:sldMasterIdLst>
   <p:notesMasterIdLst>
-    <p:notesMasterId r:id="rId28"/>
+    <p:notesMasterId r:id="rId30"/>
   </p:notesMasterIdLst>
   <p:handoutMasterIdLst>
-    <p:handoutMasterId r:id="rId29"/>
+    <p:handoutMasterId r:id="rId31"/>
   </p:handoutMasterIdLst>
   <p:sldIdLst>
     <p:sldId id="265" r:id="rId5"/>
@@ -18,27 +18,29 @@
     <p:sldId id="333" r:id="rId9"/>
     <p:sldId id="339" r:id="rId10"/>
     <p:sldId id="340" r:id="rId11"/>
-    <p:sldId id="338" r:id="rId12"/>
-    <p:sldId id="334" r:id="rId13"/>
-    <p:sldId id="335" r:id="rId14"/>
-    <p:sldId id="323" r:id="rId15"/>
-    <p:sldId id="336" r:id="rId16"/>
-    <p:sldId id="337" r:id="rId17"/>
-    <p:sldId id="311" r:id="rId18"/>
-    <p:sldId id="327" r:id="rId19"/>
-    <p:sldId id="313" r:id="rId20"/>
-    <p:sldId id="321" r:id="rId21"/>
-    <p:sldId id="322" r:id="rId22"/>
-    <p:sldId id="328" r:id="rId23"/>
-    <p:sldId id="329" r:id="rId24"/>
-    <p:sldId id="330" r:id="rId25"/>
-    <p:sldId id="331" r:id="rId26"/>
-    <p:sldId id="332" r:id="rId27"/>
+    <p:sldId id="341" r:id="rId12"/>
+    <p:sldId id="342" r:id="rId13"/>
+    <p:sldId id="338" r:id="rId14"/>
+    <p:sldId id="334" r:id="rId15"/>
+    <p:sldId id="335" r:id="rId16"/>
+    <p:sldId id="323" r:id="rId17"/>
+    <p:sldId id="336" r:id="rId18"/>
+    <p:sldId id="337" r:id="rId19"/>
+    <p:sldId id="311" r:id="rId20"/>
+    <p:sldId id="327" r:id="rId21"/>
+    <p:sldId id="313" r:id="rId22"/>
+    <p:sldId id="321" r:id="rId23"/>
+    <p:sldId id="322" r:id="rId24"/>
+    <p:sldId id="328" r:id="rId25"/>
+    <p:sldId id="329" r:id="rId26"/>
+    <p:sldId id="330" r:id="rId27"/>
+    <p:sldId id="331" r:id="rId28"/>
+    <p:sldId id="332" r:id="rId29"/>
   </p:sldIdLst>
   <p:sldSz cx="12188825" cy="6858000"/>
   <p:notesSz cx="6858000" cy="9144000"/>
   <p:custDataLst>
-    <p:tags r:id="rId30"/>
+    <p:tags r:id="rId32"/>
   </p:custDataLst>
   <p:defaultTextStyle>
     <a:defPPr>
@@ -748,7 +750,7 @@
             <a:fld id="{F93199CD-3E1B-4AE6-990F-76F925F5EA9F}" type="slidenum">
               <a:rPr lang="de-DE" smtClean="0"/>
               <a:pPr/>
-              <a:t>21</a:t>
+              <a:t>23</a:t>
             </a:fld>
             <a:endParaRPr lang="de-DE" dirty="0"/>
           </a:p>
@@ -833,7 +835,7 @@
             <a:fld id="{F93199CD-3E1B-4AE6-990F-76F925F5EA9F}" type="slidenum">
               <a:rPr lang="de-DE" smtClean="0"/>
               <a:pPr/>
-              <a:t>23</a:t>
+              <a:t>25</a:t>
             </a:fld>
             <a:endParaRPr lang="de-DE" dirty="0"/>
           </a:p>
@@ -8820,6 +8822,1038 @@
           <a:p>
             <a:r>
               <a:rPr lang="de-DE" dirty="0"/>
+              <a:t>Netzwerk Switch</a:t>
+            </a:r>
+          </a:p>
+        </p:txBody>
+      </p:sp>
+      <p:sp>
+        <p:nvSpPr>
+          <p:cNvPr id="3" name="Inhaltsplatzhalter 2"/>
+          <p:cNvSpPr>
+            <a:spLocks noGrp="1"/>
+          </p:cNvSpPr>
+          <p:nvPr>
+            <p:ph idx="1"/>
+          </p:nvPr>
+        </p:nvSpPr>
+        <p:spPr/>
+        <p:txBody>
+          <a:bodyPr/>
+          <a:lstStyle/>
+          <a:p>
+            <a:r>
+              <a:rPr lang="en-US" dirty="0"/>
+              <a:t>HP Gigabit Switch 1820-24G (J9980A)</a:t>
+            </a:r>
+          </a:p>
+          <a:p>
+            <a:pPr lvl="1"/>
+            <a:r>
+              <a:rPr lang="de-DE" b="1" dirty="0"/>
+              <a:t>24</a:t>
+            </a:r>
+            <a:r>
+              <a:rPr lang="de-DE" dirty="0"/>
+              <a:t>x Ethernet, </a:t>
+            </a:r>
+            <a:r>
+              <a:rPr lang="de-DE" b="1" dirty="0"/>
+              <a:t>2</a:t>
+            </a:r>
+            <a:r>
+              <a:rPr lang="de-DE" dirty="0"/>
+              <a:t>x DFP Anschlüssen.</a:t>
+            </a:r>
+          </a:p>
+          <a:p>
+            <a:pPr lvl="1"/>
+            <a:r>
+              <a:rPr lang="de-DE" dirty="0"/>
+              <a:t>52 </a:t>
+            </a:r>
+            <a:r>
+              <a:rPr lang="de-DE" dirty="0" err="1"/>
+              <a:t>Gbps</a:t>
+            </a:r>
+            <a:r>
+              <a:rPr lang="de-DE" dirty="0"/>
+              <a:t> Kapazität.</a:t>
+            </a:r>
+          </a:p>
+          <a:p>
+            <a:pPr lvl="1"/>
+            <a:r>
+              <a:rPr lang="de-DE" dirty="0"/>
+              <a:t>22W Leistung (Last).</a:t>
+            </a:r>
+          </a:p>
+        </p:txBody>
+      </p:sp>
+    </p:spTree>
+    <p:extLst>
+      <p:ext uri="{BB962C8B-B14F-4D97-AF65-F5344CB8AC3E}">
+        <p14:creationId xmlns:p14="http://schemas.microsoft.com/office/powerpoint/2010/main" val="1943243209"/>
+      </p:ext>
+    </p:extLst>
+  </p:cSld>
+  <p:clrMapOvr>
+    <a:masterClrMapping/>
+  </p:clrMapOvr>
+  <mc:AlternateContent xmlns:mc="http://schemas.openxmlformats.org/markup-compatibility/2006" xmlns:p14="http://schemas.microsoft.com/office/powerpoint/2010/main">
+    <mc:Choice Requires="p14">
+      <p:transition spd="med" p14:dur="700">
+        <p:fade/>
+      </p:transition>
+    </mc:Choice>
+    <mc:Fallback xmlns="">
+      <p:transition spd="med">
+        <p:fade/>
+      </p:transition>
+    </mc:Fallback>
+  </mc:AlternateContent>
+</p:sld>
+</file>
+
+<file path=ppt/slides/slide11.xml><?xml version="1.0" encoding="utf-8"?>
+<p:sld xmlns:a="http://schemas.openxmlformats.org/drawingml/2006/main" xmlns:r="http://schemas.openxmlformats.org/officeDocument/2006/relationships" xmlns:p="http://schemas.openxmlformats.org/presentationml/2006/main">
+  <p:cSld>
+    <p:spTree>
+      <p:nvGrpSpPr>
+        <p:cNvPr id="1" name=""/>
+        <p:cNvGrpSpPr/>
+        <p:nvPr/>
+      </p:nvGrpSpPr>
+      <p:grpSpPr>
+        <a:xfrm>
+          <a:off x="0" y="0"/>
+          <a:ext cx="0" cy="0"/>
+          <a:chOff x="0" y="0"/>
+          <a:chExt cx="0" cy="0"/>
+        </a:xfrm>
+      </p:grpSpPr>
+      <p:sp>
+        <p:nvSpPr>
+          <p:cNvPr id="2" name="Titel 1"/>
+          <p:cNvSpPr>
+            <a:spLocks noGrp="1"/>
+          </p:cNvSpPr>
+          <p:nvPr>
+            <p:ph type="title"/>
+          </p:nvPr>
+        </p:nvSpPr>
+        <p:spPr/>
+        <p:txBody>
+          <a:bodyPr/>
+          <a:lstStyle/>
+          <a:p>
+            <a:r>
+              <a:rPr lang="de-DE" dirty="0"/>
+              <a:t>Netzwerk</a:t>
+            </a:r>
+          </a:p>
+        </p:txBody>
+      </p:sp>
+      <p:graphicFrame>
+        <p:nvGraphicFramePr>
+          <p:cNvPr id="5" name="Tabelle 4"/>
+          <p:cNvGraphicFramePr>
+            <a:graphicFrameLocks noGrp="1"/>
+          </p:cNvGraphicFramePr>
+          <p:nvPr>
+            <p:extLst>
+              <p:ext uri="{D42A27DB-BD31-4B8C-83A1-F6EECF244321}">
+                <p14:modId xmlns:p14="http://schemas.microsoft.com/office/powerpoint/2010/main" val="890546221"/>
+              </p:ext>
+            </p:extLst>
+          </p:nvPr>
+        </p:nvGraphicFramePr>
+        <p:xfrm>
+          <a:off x="1197868" y="2132856"/>
+          <a:ext cx="8815470" cy="4609804"/>
+        </p:xfrm>
+        <a:graphic>
+          <a:graphicData uri="http://schemas.openxmlformats.org/drawingml/2006/table">
+            <a:tbl>
+              <a:tblPr firstRow="1" bandRow="1">
+                <a:tableStyleId>{5C22544A-7EE6-4342-B048-85BDC9FD1C3A}</a:tableStyleId>
+              </a:tblPr>
+              <a:tblGrid>
+                <a:gridCol w="2938490">
+                  <a:extLst>
+                    <a:ext uri="{9D8B030D-6E8A-4147-A177-3AD203B41FA5}">
+                      <a16:colId xmlns:a16="http://schemas.microsoft.com/office/drawing/2014/main" val="20000"/>
+                    </a:ext>
+                  </a:extLst>
+                </a:gridCol>
+                <a:gridCol w="2938490">
+                  <a:extLst>
+                    <a:ext uri="{9D8B030D-6E8A-4147-A177-3AD203B41FA5}">
+                      <a16:colId xmlns:a16="http://schemas.microsoft.com/office/drawing/2014/main" val="20001"/>
+                    </a:ext>
+                  </a:extLst>
+                </a:gridCol>
+                <a:gridCol w="2938490">
+                  <a:extLst>
+                    <a:ext uri="{9D8B030D-6E8A-4147-A177-3AD203B41FA5}">
+                      <a16:colId xmlns:a16="http://schemas.microsoft.com/office/drawing/2014/main" val="20002"/>
+                    </a:ext>
+                  </a:extLst>
+                </a:gridCol>
+              </a:tblGrid>
+              <a:tr h="495165">
+                <a:tc>
+                  <a:txBody>
+                    <a:bodyPr/>
+                    <a:lstStyle/>
+                    <a:p>
+                      <a:r>
+                        <a:rPr lang="de-DE" dirty="0"/>
+                        <a:t>Typ</a:t>
+                      </a:r>
+                    </a:p>
+                  </a:txBody>
+                  <a:tcPr/>
+                </a:tc>
+                <a:tc>
+                  <a:txBody>
+                    <a:bodyPr/>
+                    <a:lstStyle/>
+                    <a:p>
+                      <a:r>
+                        <a:rPr lang="de-DE" dirty="0"/>
+                        <a:t>Model</a:t>
+                      </a:r>
+                    </a:p>
+                  </a:txBody>
+                  <a:tcPr>
+                    <a:lnB w="12700" cap="flat" cmpd="sng" algn="ctr">
+                      <a:solidFill>
+                        <a:schemeClr val="tx1"/>
+                      </a:solidFill>
+                      <a:prstDash val="solid"/>
+                      <a:round/>
+                      <a:headEnd type="none" w="med" len="med"/>
+                      <a:tailEnd type="none" w="med" len="med"/>
+                    </a:lnB>
+                  </a:tcPr>
+                </a:tc>
+                <a:tc>
+                  <a:txBody>
+                    <a:bodyPr/>
+                    <a:lstStyle/>
+                    <a:p>
+                      <a:r>
+                        <a:rPr lang="de-DE" dirty="0"/>
+                        <a:t>Preis</a:t>
+                      </a:r>
+                    </a:p>
+                  </a:txBody>
+                  <a:tcPr>
+                    <a:lnB w="12700" cap="flat" cmpd="sng" algn="ctr">
+                      <a:solidFill>
+                        <a:schemeClr val="tx1"/>
+                      </a:solidFill>
+                      <a:prstDash val="solid"/>
+                      <a:round/>
+                      <a:headEnd type="none" w="med" len="med"/>
+                      <a:tailEnd type="none" w="med" len="med"/>
+                    </a:lnB>
+                  </a:tcPr>
+                </a:tc>
+                <a:extLst>
+                  <a:ext uri="{0D108BD9-81ED-4DB2-BD59-A6C34878D82A}">
+                    <a16:rowId xmlns:a16="http://schemas.microsoft.com/office/drawing/2014/main" val="10000"/>
+                  </a:ext>
+                </a:extLst>
+              </a:tr>
+              <a:tr h="495165">
+                <a:tc>
+                  <a:txBody>
+                    <a:bodyPr/>
+                    <a:lstStyle/>
+                    <a:p>
+                      <a:pPr marL="0" marR="0" indent="0" algn="l" defTabSz="914126" rtl="0" eaLnBrk="1" fontAlgn="auto" latinLnBrk="0" hangingPunct="1">
+                        <a:lnSpc>
+                          <a:spcPct val="100000"/>
+                        </a:lnSpc>
+                        <a:spcBef>
+                          <a:spcPts val="0"/>
+                        </a:spcBef>
+                        <a:spcAft>
+                          <a:spcPts val="0"/>
+                        </a:spcAft>
+                        <a:buClrTx/>
+                        <a:buSzTx/>
+                        <a:buFontTx/>
+                        <a:buNone/>
+                        <a:tabLst/>
+                        <a:defRPr/>
+                      </a:pPr>
+                      <a:r>
+                        <a:rPr lang="de-DE" sz="1799" b="0" i="0" u="none" strike="noStrike" kern="1200" dirty="0">
+                          <a:solidFill>
+                            <a:schemeClr val="dk1"/>
+                          </a:solidFill>
+                          <a:effectLst/>
+                          <a:latin typeface="+mn-lt"/>
+                          <a:ea typeface="+mn-ea"/>
+                          <a:cs typeface="+mn-cs"/>
+                        </a:rPr>
+                        <a:t>Switch</a:t>
+                      </a:r>
+                      <a:endParaRPr lang="de-DE" b="1" dirty="0">
+                        <a:effectLst/>
+                      </a:endParaRPr>
+                    </a:p>
+                  </a:txBody>
+                  <a:tcPr>
+                    <a:lnR w="12700" cap="flat" cmpd="sng" algn="ctr">
+                      <a:solidFill>
+                        <a:schemeClr val="tx1"/>
+                      </a:solidFill>
+                      <a:prstDash val="solid"/>
+                      <a:round/>
+                      <a:headEnd type="none" w="med" len="med"/>
+                      <a:tailEnd type="none" w="med" len="med"/>
+                    </a:lnR>
+                  </a:tcPr>
+                </a:tc>
+                <a:tc>
+                  <a:txBody>
+                    <a:bodyPr/>
+                    <a:lstStyle/>
+                    <a:p>
+                      <a:pPr marL="0" marR="0" indent="0" algn="l" defTabSz="914126" rtl="0" eaLnBrk="1" fontAlgn="auto" latinLnBrk="0" hangingPunct="1">
+                        <a:lnSpc>
+                          <a:spcPct val="100000"/>
+                        </a:lnSpc>
+                        <a:spcBef>
+                          <a:spcPts val="0"/>
+                        </a:spcBef>
+                        <a:spcAft>
+                          <a:spcPts val="0"/>
+                        </a:spcAft>
+                        <a:buClrTx/>
+                        <a:buSzTx/>
+                        <a:buFontTx/>
+                        <a:buNone/>
+                        <a:tabLst/>
+                        <a:defRPr/>
+                      </a:pPr>
+                      <a:r>
+                        <a:rPr lang="en-US" dirty="0"/>
+                        <a:t>HP Gigabit Switch 1820-24G (J9980A)</a:t>
+                      </a:r>
+                    </a:p>
+                  </a:txBody>
+                  <a:tcPr>
+                    <a:lnL w="12700" cap="flat" cmpd="sng" algn="ctr">
+                      <a:solidFill>
+                        <a:schemeClr val="tx1"/>
+                      </a:solidFill>
+                      <a:prstDash val="solid"/>
+                      <a:round/>
+                      <a:headEnd type="none" w="med" len="med"/>
+                      <a:tailEnd type="none" w="med" len="med"/>
+                    </a:lnL>
+                    <a:lnR w="12700" cap="flat" cmpd="sng" algn="ctr">
+                      <a:solidFill>
+                        <a:schemeClr val="tx1"/>
+                      </a:solidFill>
+                      <a:prstDash val="solid"/>
+                      <a:round/>
+                      <a:headEnd type="none" w="med" len="med"/>
+                      <a:tailEnd type="none" w="med" len="med"/>
+                    </a:lnR>
+                    <a:lnT w="12700" cap="flat" cmpd="sng" algn="ctr">
+                      <a:solidFill>
+                        <a:schemeClr val="tx1"/>
+                      </a:solidFill>
+                      <a:prstDash val="solid"/>
+                      <a:round/>
+                      <a:headEnd type="none" w="med" len="med"/>
+                      <a:tailEnd type="none" w="med" len="med"/>
+                    </a:lnT>
+                    <a:lnB w="12700" cap="flat" cmpd="sng" algn="ctr">
+                      <a:solidFill>
+                        <a:schemeClr val="tx1"/>
+                      </a:solidFill>
+                      <a:prstDash val="solid"/>
+                      <a:round/>
+                      <a:headEnd type="none" w="med" len="med"/>
+                      <a:tailEnd type="none" w="med" len="med"/>
+                    </a:lnB>
+                  </a:tcPr>
+                </a:tc>
+                <a:tc>
+                  <a:txBody>
+                    <a:bodyPr/>
+                    <a:lstStyle/>
+                    <a:p>
+                      <a:endParaRPr lang="de-DE" dirty="0"/>
+                    </a:p>
+                  </a:txBody>
+                  <a:tcPr>
+                    <a:lnL w="12700" cap="flat" cmpd="sng" algn="ctr">
+                      <a:solidFill>
+                        <a:schemeClr val="tx1"/>
+                      </a:solidFill>
+                      <a:prstDash val="solid"/>
+                      <a:round/>
+                      <a:headEnd type="none" w="med" len="med"/>
+                      <a:tailEnd type="none" w="med" len="med"/>
+                    </a:lnL>
+                    <a:lnT w="12700" cap="flat" cmpd="sng" algn="ctr">
+                      <a:solidFill>
+                        <a:schemeClr val="tx1"/>
+                      </a:solidFill>
+                      <a:prstDash val="solid"/>
+                      <a:round/>
+                      <a:headEnd type="none" w="med" len="med"/>
+                      <a:tailEnd type="none" w="med" len="med"/>
+                    </a:lnT>
+                  </a:tcPr>
+                </a:tc>
+                <a:extLst>
+                  <a:ext uri="{0D108BD9-81ED-4DB2-BD59-A6C34878D82A}">
+                    <a16:rowId xmlns:a16="http://schemas.microsoft.com/office/drawing/2014/main" val="10001"/>
+                  </a:ext>
+                </a:extLst>
+              </a:tr>
+              <a:tr h="495165">
+                <a:tc>
+                  <a:txBody>
+                    <a:bodyPr/>
+                    <a:lstStyle/>
+                    <a:p>
+                      <a:endParaRPr lang="de-DE" i="1" dirty="0"/>
+                    </a:p>
+                  </a:txBody>
+                  <a:tcPr/>
+                </a:tc>
+                <a:tc>
+                  <a:txBody>
+                    <a:bodyPr/>
+                    <a:lstStyle/>
+                    <a:p>
+                      <a:endParaRPr lang="de-DE" dirty="0"/>
+                    </a:p>
+                  </a:txBody>
+                  <a:tcPr>
+                    <a:lnT w="12700" cap="flat" cmpd="sng" algn="ctr">
+                      <a:solidFill>
+                        <a:schemeClr val="tx1"/>
+                      </a:solidFill>
+                      <a:prstDash val="solid"/>
+                      <a:round/>
+                      <a:headEnd type="none" w="med" len="med"/>
+                      <a:tailEnd type="none" w="med" len="med"/>
+                    </a:lnT>
+                  </a:tcPr>
+                </a:tc>
+                <a:tc>
+                  <a:txBody>
+                    <a:bodyPr/>
+                    <a:lstStyle/>
+                    <a:p>
+                      <a:endParaRPr lang="de-DE"/>
+                    </a:p>
+                  </a:txBody>
+                  <a:tcPr/>
+                </a:tc>
+                <a:extLst>
+                  <a:ext uri="{0D108BD9-81ED-4DB2-BD59-A6C34878D82A}">
+                    <a16:rowId xmlns:a16="http://schemas.microsoft.com/office/drawing/2014/main" val="10002"/>
+                  </a:ext>
+                </a:extLst>
+              </a:tr>
+              <a:tr h="495165">
+                <a:tc>
+                  <a:txBody>
+                    <a:bodyPr/>
+                    <a:lstStyle/>
+                    <a:p>
+                      <a:r>
+                        <a:rPr lang="en-US" dirty="0"/>
+                        <a:t>Router</a:t>
+                      </a:r>
+                      <a:endParaRPr lang="de-DE" dirty="0"/>
+                    </a:p>
+                  </a:txBody>
+                  <a:tcPr/>
+                </a:tc>
+                <a:tc>
+                  <a:txBody>
+                    <a:bodyPr/>
+                    <a:lstStyle/>
+                    <a:p>
+                      <a:r>
+                        <a:rPr lang="en-US" dirty="0"/>
+                        <a:t>ZyXel ZyWall USG 100</a:t>
+                      </a:r>
+                      <a:endParaRPr lang="de-DE" dirty="0"/>
+                    </a:p>
+                  </a:txBody>
+                  <a:tcPr/>
+                </a:tc>
+                <a:tc>
+                  <a:txBody>
+                    <a:bodyPr/>
+                    <a:lstStyle/>
+                    <a:p>
+                      <a:r>
+                        <a:rPr lang="en-US" dirty="0"/>
+                        <a:t>300€</a:t>
+                      </a:r>
+                      <a:endParaRPr lang="de-DE" dirty="0"/>
+                    </a:p>
+                  </a:txBody>
+                  <a:tcPr/>
+                </a:tc>
+                <a:extLst>
+                  <a:ext uri="{0D108BD9-81ED-4DB2-BD59-A6C34878D82A}">
+                    <a16:rowId xmlns:a16="http://schemas.microsoft.com/office/drawing/2014/main" val="10003"/>
+                  </a:ext>
+                </a:extLst>
+              </a:tr>
+              <a:tr h="854327">
+                <a:tc>
+                  <a:txBody>
+                    <a:bodyPr/>
+                    <a:lstStyle/>
+                    <a:p>
+                      <a:r>
+                        <a:rPr lang="en-US" dirty="0"/>
+                        <a:t>PoE Switch für IP Telefone</a:t>
+                      </a:r>
+                      <a:endParaRPr lang="de-DE" dirty="0"/>
+                    </a:p>
+                  </a:txBody>
+                  <a:tcPr/>
+                </a:tc>
+                <a:tc>
+                  <a:txBody>
+                    <a:bodyPr/>
+                    <a:lstStyle/>
+                    <a:p>
+                      <a:r>
+                        <a:rPr lang="en-US" dirty="0"/>
+                        <a:t>D.Link 24.Port PoE Switch DGS-1210-24P</a:t>
+                      </a:r>
+                      <a:endParaRPr lang="de-DE" dirty="0"/>
+                    </a:p>
+                  </a:txBody>
+                  <a:tcPr/>
+                </a:tc>
+                <a:tc>
+                  <a:txBody>
+                    <a:bodyPr/>
+                    <a:lstStyle/>
+                    <a:p>
+                      <a:r>
+                        <a:rPr lang="en-US" dirty="0"/>
+                        <a:t>350€</a:t>
+                      </a:r>
+                      <a:endParaRPr lang="de-DE" dirty="0"/>
+                    </a:p>
+                  </a:txBody>
+                  <a:tcPr/>
+                </a:tc>
+                <a:extLst>
+                  <a:ext uri="{0D108BD9-81ED-4DB2-BD59-A6C34878D82A}">
+                    <a16:rowId xmlns:a16="http://schemas.microsoft.com/office/drawing/2014/main" val="10004"/>
+                  </a:ext>
+                </a:extLst>
+              </a:tr>
+              <a:tr h="495165">
+                <a:tc>
+                  <a:txBody>
+                    <a:bodyPr/>
+                    <a:lstStyle/>
+                    <a:p>
+                      <a:r>
+                        <a:rPr lang="en-US" dirty="0"/>
+                        <a:t>Placetel Telefonanlage</a:t>
+                      </a:r>
+                      <a:endParaRPr lang="de-DE" dirty="0"/>
+                    </a:p>
+                  </a:txBody>
+                  <a:tcPr/>
+                </a:tc>
+                <a:tc>
+                  <a:txBody>
+                    <a:bodyPr/>
+                    <a:lstStyle/>
+                    <a:p>
+                      <a:r>
+                        <a:rPr lang="en-US" dirty="0"/>
+                        <a:t>Placetel PROFI Complete</a:t>
+                      </a:r>
+                      <a:endParaRPr lang="de-DE" dirty="0"/>
+                    </a:p>
+                  </a:txBody>
+                  <a:tcPr/>
+                </a:tc>
+                <a:tc>
+                  <a:txBody>
+                    <a:bodyPr/>
+                    <a:lstStyle/>
+                    <a:p>
+                      <a:r>
+                        <a:rPr lang="en-US" dirty="0"/>
+                        <a:t>13,90€ im Monat + Zusätzliche Telefone</a:t>
+                      </a:r>
+                      <a:endParaRPr lang="de-DE" dirty="0"/>
+                    </a:p>
+                  </a:txBody>
+                  <a:tcPr/>
+                </a:tc>
+                <a:extLst>
+                  <a:ext uri="{0D108BD9-81ED-4DB2-BD59-A6C34878D82A}">
+                    <a16:rowId xmlns:a16="http://schemas.microsoft.com/office/drawing/2014/main" val="10005"/>
+                  </a:ext>
+                </a:extLst>
+              </a:tr>
+              <a:tr h="495165">
+                <a:tc>
+                  <a:txBody>
+                    <a:bodyPr/>
+                    <a:lstStyle/>
+                    <a:p>
+                      <a:endParaRPr lang="de-DE" dirty="0"/>
+                    </a:p>
+                  </a:txBody>
+                  <a:tcPr/>
+                </a:tc>
+                <a:tc>
+                  <a:txBody>
+                    <a:bodyPr/>
+                    <a:lstStyle/>
+                    <a:p>
+                      <a:endParaRPr lang="de-DE"/>
+                    </a:p>
+                  </a:txBody>
+                  <a:tcPr/>
+                </a:tc>
+                <a:tc>
+                  <a:txBody>
+                    <a:bodyPr/>
+                    <a:lstStyle/>
+                    <a:p>
+                      <a:endParaRPr lang="de-DE" dirty="0"/>
+                    </a:p>
+                  </a:txBody>
+                  <a:tcPr/>
+                </a:tc>
+                <a:extLst>
+                  <a:ext uri="{0D108BD9-81ED-4DB2-BD59-A6C34878D82A}">
+                    <a16:rowId xmlns:a16="http://schemas.microsoft.com/office/drawing/2014/main" val="10006"/>
+                  </a:ext>
+                </a:extLst>
+              </a:tr>
+              <a:tr h="495165">
+                <a:tc>
+                  <a:txBody>
+                    <a:bodyPr/>
+                    <a:lstStyle/>
+                    <a:p>
+                      <a:endParaRPr lang="de-DE" dirty="0"/>
+                    </a:p>
+                  </a:txBody>
+                  <a:tcPr/>
+                </a:tc>
+                <a:tc>
+                  <a:txBody>
+                    <a:bodyPr/>
+                    <a:lstStyle/>
+                    <a:p>
+                      <a:endParaRPr lang="de-DE" dirty="0"/>
+                    </a:p>
+                  </a:txBody>
+                  <a:tcPr/>
+                </a:tc>
+                <a:tc>
+                  <a:txBody>
+                    <a:bodyPr/>
+                    <a:lstStyle/>
+                    <a:p>
+                      <a:endParaRPr lang="de-DE" dirty="0"/>
+                    </a:p>
+                  </a:txBody>
+                  <a:tcPr/>
+                </a:tc>
+                <a:extLst>
+                  <a:ext uri="{0D108BD9-81ED-4DB2-BD59-A6C34878D82A}">
+                    <a16:rowId xmlns:a16="http://schemas.microsoft.com/office/drawing/2014/main" val="10007"/>
+                  </a:ext>
+                </a:extLst>
+              </a:tr>
+            </a:tbl>
+          </a:graphicData>
+        </a:graphic>
+      </p:graphicFrame>
+      <p:sp>
+        <p:nvSpPr>
+          <p:cNvPr id="4" name="Textfeld 3"/>
+          <p:cNvSpPr txBox="1"/>
+          <p:nvPr/>
+        </p:nvSpPr>
+        <p:spPr>
+          <a:xfrm>
+            <a:off x="7102524" y="2780928"/>
+            <a:ext cx="2736304" cy="369332"/>
+          </a:xfrm>
+          <a:prstGeom prst="rect">
+            <a:avLst/>
+          </a:prstGeom>
+          <a:noFill/>
+        </p:spPr>
+        <p:txBody>
+          <a:bodyPr wrap="square" rtlCol="0">
+            <a:spAutoFit/>
+          </a:bodyPr>
+          <a:lstStyle/>
+          <a:p>
+            <a:r>
+              <a:rPr lang="el-GR" sz="1799" dirty="0">
+                <a:solidFill>
+                  <a:schemeClr val="bg1"/>
+                </a:solidFill>
+              </a:rPr>
+              <a:t>Σ</a:t>
+            </a:r>
+            <a:r>
+              <a:rPr lang="de-DE" sz="1799" dirty="0">
+                <a:solidFill>
+                  <a:schemeClr val="bg1"/>
+                </a:solidFill>
+              </a:rPr>
+              <a:t> 145,31€</a:t>
+            </a:r>
+            <a:endParaRPr lang="de-DE" dirty="0"/>
+          </a:p>
+        </p:txBody>
+      </p:sp>
+      <p:sp>
+        <p:nvSpPr>
+          <p:cNvPr id="6" name="Textfeld 5"/>
+          <p:cNvSpPr txBox="1"/>
+          <p:nvPr/>
+        </p:nvSpPr>
+        <p:spPr>
+          <a:xfrm>
+            <a:off x="1269876" y="3284984"/>
+            <a:ext cx="2520280" cy="369332"/>
+          </a:xfrm>
+          <a:prstGeom prst="rect">
+            <a:avLst/>
+          </a:prstGeom>
+          <a:noFill/>
+        </p:spPr>
+        <p:txBody>
+          <a:bodyPr wrap="square" rtlCol="0">
+            <a:spAutoFit/>
+          </a:bodyPr>
+          <a:lstStyle/>
+          <a:p>
+            <a:r>
+              <a:rPr lang="de-DE" dirty="0">
+                <a:solidFill>
+                  <a:schemeClr val="bg1"/>
+                </a:solidFill>
+              </a:rPr>
+              <a:t>NAS</a:t>
+            </a:r>
+          </a:p>
+        </p:txBody>
+      </p:sp>
+    </p:spTree>
+    <p:extLst>
+      <p:ext uri="{BB962C8B-B14F-4D97-AF65-F5344CB8AC3E}">
+        <p14:creationId xmlns:p14="http://schemas.microsoft.com/office/powerpoint/2010/main" val="1813666035"/>
+      </p:ext>
+    </p:extLst>
+  </p:cSld>
+  <p:clrMapOvr>
+    <a:masterClrMapping/>
+  </p:clrMapOvr>
+  <mc:AlternateContent xmlns:mc="http://schemas.openxmlformats.org/markup-compatibility/2006" xmlns:p14="http://schemas.microsoft.com/office/powerpoint/2010/main">
+    <mc:Choice Requires="p14">
+      <p:transition spd="med" p14:dur="700">
+        <p:fade/>
+      </p:transition>
+    </mc:Choice>
+    <mc:Fallback xmlns="">
+      <p:transition spd="med">
+        <p:fade/>
+      </p:transition>
+    </mc:Fallback>
+  </mc:AlternateContent>
+  <p:timing>
+    <p:tnLst>
+      <p:par>
+        <p:cTn id="1" dur="indefinite" restart="never" nodeType="tmRoot">
+          <p:childTnLst>
+            <p:seq concurrent="1" nextAc="seek">
+              <p:cTn id="2" dur="indefinite" nodeType="mainSeq">
+                <p:childTnLst>
+                  <p:par>
+                    <p:cTn id="3" fill="hold">
+                      <p:stCondLst>
+                        <p:cond delay="indefinite"/>
+                      </p:stCondLst>
+                      <p:childTnLst>
+                        <p:par>
+                          <p:cTn id="4" fill="hold">
+                            <p:stCondLst>
+                              <p:cond delay="0"/>
+                            </p:stCondLst>
+                            <p:childTnLst>
+                              <p:par>
+                                <p:cTn id="5" presetID="2" presetClass="entr" presetSubtype="4" fill="hold" grpId="0" nodeType="clickEffect">
+                                  <p:stCondLst>
+                                    <p:cond delay="0"/>
+                                  </p:stCondLst>
+                                  <p:childTnLst>
+                                    <p:set>
+                                      <p:cBhvr>
+                                        <p:cTn id="6" dur="1" fill="hold">
+                                          <p:stCondLst>
+                                            <p:cond delay="0"/>
+                                          </p:stCondLst>
+                                        </p:cTn>
+                                        <p:tgtEl>
+                                          <p:spTgt spid="4"/>
+                                        </p:tgtEl>
+                                        <p:attrNameLst>
+                                          <p:attrName>style.visibility</p:attrName>
+                                        </p:attrNameLst>
+                                      </p:cBhvr>
+                                      <p:to>
+                                        <p:strVal val="visible"/>
+                                      </p:to>
+                                    </p:set>
+                                    <p:anim calcmode="lin" valueType="num">
+                                      <p:cBhvr additive="base">
+                                        <p:cTn id="7" dur="500" fill="hold"/>
+                                        <p:tgtEl>
+                                          <p:spTgt spid="4"/>
+                                        </p:tgtEl>
+                                        <p:attrNameLst>
+                                          <p:attrName>ppt_x</p:attrName>
+                                        </p:attrNameLst>
+                                      </p:cBhvr>
+                                      <p:tavLst>
+                                        <p:tav tm="0">
+                                          <p:val>
+                                            <p:strVal val="#ppt_x"/>
+                                          </p:val>
+                                        </p:tav>
+                                        <p:tav tm="100000">
+                                          <p:val>
+                                            <p:strVal val="#ppt_x"/>
+                                          </p:val>
+                                        </p:tav>
+                                      </p:tavLst>
+                                    </p:anim>
+                                    <p:anim calcmode="lin" valueType="num">
+                                      <p:cBhvr additive="base">
+                                        <p:cTn id="8" dur="500" fill="hold"/>
+                                        <p:tgtEl>
+                                          <p:spTgt spid="4"/>
+                                        </p:tgtEl>
+                                        <p:attrNameLst>
+                                          <p:attrName>ppt_y</p:attrName>
+                                        </p:attrNameLst>
+                                      </p:cBhvr>
+                                      <p:tavLst>
+                                        <p:tav tm="0">
+                                          <p:val>
+                                            <p:strVal val="1+#ppt_h/2"/>
+                                          </p:val>
+                                        </p:tav>
+                                        <p:tav tm="100000">
+                                          <p:val>
+                                            <p:strVal val="#ppt_y"/>
+                                          </p:val>
+                                        </p:tav>
+                                      </p:tavLst>
+                                    </p:anim>
+                                  </p:childTnLst>
+                                </p:cTn>
+                              </p:par>
+                            </p:childTnLst>
+                          </p:cTn>
+                        </p:par>
+                      </p:childTnLst>
+                    </p:cTn>
+                  </p:par>
+                  <p:par>
+                    <p:cTn id="9" fill="hold">
+                      <p:stCondLst>
+                        <p:cond delay="indefinite"/>
+                      </p:stCondLst>
+                      <p:childTnLst>
+                        <p:par>
+                          <p:cTn id="10" fill="hold">
+                            <p:stCondLst>
+                              <p:cond delay="0"/>
+                            </p:stCondLst>
+                            <p:childTnLst>
+                              <p:par>
+                                <p:cTn id="11" presetID="2" presetClass="entr" presetSubtype="4" fill="hold" nodeType="clickEffect">
+                                  <p:stCondLst>
+                                    <p:cond delay="0"/>
+                                  </p:stCondLst>
+                                  <p:childTnLst>
+                                    <p:set>
+                                      <p:cBhvr>
+                                        <p:cTn id="12" dur="1" fill="hold">
+                                          <p:stCondLst>
+                                            <p:cond delay="0"/>
+                                          </p:stCondLst>
+                                        </p:cTn>
+                                        <p:tgtEl>
+                                          <p:spTgt spid="6">
+                                            <p:txEl>
+                                              <p:pRg st="0" end="0"/>
+                                            </p:txEl>
+                                          </p:spTgt>
+                                        </p:tgtEl>
+                                        <p:attrNameLst>
+                                          <p:attrName>style.visibility</p:attrName>
+                                        </p:attrNameLst>
+                                      </p:cBhvr>
+                                      <p:to>
+                                        <p:strVal val="visible"/>
+                                      </p:to>
+                                    </p:set>
+                                    <p:anim calcmode="lin" valueType="num">
+                                      <p:cBhvr additive="base">
+                                        <p:cTn id="13" dur="500" fill="hold"/>
+                                        <p:tgtEl>
+                                          <p:spTgt spid="6">
+                                            <p:txEl>
+                                              <p:pRg st="0" end="0"/>
+                                            </p:txEl>
+                                          </p:spTgt>
+                                        </p:tgtEl>
+                                        <p:attrNameLst>
+                                          <p:attrName>ppt_x</p:attrName>
+                                        </p:attrNameLst>
+                                      </p:cBhvr>
+                                      <p:tavLst>
+                                        <p:tav tm="0">
+                                          <p:val>
+                                            <p:strVal val="#ppt_x"/>
+                                          </p:val>
+                                        </p:tav>
+                                        <p:tav tm="100000">
+                                          <p:val>
+                                            <p:strVal val="#ppt_x"/>
+                                          </p:val>
+                                        </p:tav>
+                                      </p:tavLst>
+                                    </p:anim>
+                                    <p:anim calcmode="lin" valueType="num">
+                                      <p:cBhvr additive="base">
+                                        <p:cTn id="14" dur="500" fill="hold"/>
+                                        <p:tgtEl>
+                                          <p:spTgt spid="6">
+                                            <p:txEl>
+                                              <p:pRg st="0" end="0"/>
+                                            </p:txEl>
+                                          </p:spTgt>
+                                        </p:tgtEl>
+                                        <p:attrNameLst>
+                                          <p:attrName>ppt_y</p:attrName>
+                                        </p:attrNameLst>
+                                      </p:cBhvr>
+                                      <p:tavLst>
+                                        <p:tav tm="0">
+                                          <p:val>
+                                            <p:strVal val="1+#ppt_h/2"/>
+                                          </p:val>
+                                        </p:tav>
+                                        <p:tav tm="100000">
+                                          <p:val>
+                                            <p:strVal val="#ppt_y"/>
+                                          </p:val>
+                                        </p:tav>
+                                      </p:tavLst>
+                                    </p:anim>
+                                  </p:childTnLst>
+                                </p:cTn>
+                              </p:par>
+                            </p:childTnLst>
+                          </p:cTn>
+                        </p:par>
+                      </p:childTnLst>
+                    </p:cTn>
+                  </p:par>
+                </p:childTnLst>
+              </p:cTn>
+              <p:prevCondLst>
+                <p:cond evt="onPrev" delay="0">
+                  <p:tgtEl>
+                    <p:sldTgt/>
+                  </p:tgtEl>
+                </p:cond>
+              </p:prevCondLst>
+              <p:nextCondLst>
+                <p:cond evt="onNext" delay="0">
+                  <p:tgtEl>
+                    <p:sldTgt/>
+                  </p:tgtEl>
+                </p:cond>
+              </p:nextCondLst>
+            </p:seq>
+          </p:childTnLst>
+        </p:cTn>
+      </p:par>
+    </p:tnLst>
+    <p:bldLst>
+      <p:bldP spid="4" grpId="0"/>
+    </p:bldLst>
+  </p:timing>
+</p:sld>
+</file>
+
+<file path=ppt/slides/slide12.xml><?xml version="1.0" encoding="utf-8"?>
+<p:sld xmlns:a="http://schemas.openxmlformats.org/drawingml/2006/main" xmlns:r="http://schemas.openxmlformats.org/officeDocument/2006/relationships" xmlns:p="http://schemas.openxmlformats.org/presentationml/2006/main">
+  <p:cSld>
+    <p:spTree>
+      <p:nvGrpSpPr>
+        <p:cNvPr id="1" name=""/>
+        <p:cNvGrpSpPr/>
+        <p:nvPr/>
+      </p:nvGrpSpPr>
+      <p:grpSpPr>
+        <a:xfrm>
+          <a:off x="0" y="0"/>
+          <a:ext cx="0" cy="0"/>
+          <a:chOff x="0" y="0"/>
+          <a:chExt cx="0" cy="0"/>
+        </a:xfrm>
+      </p:grpSpPr>
+      <p:sp>
+        <p:nvSpPr>
+          <p:cNvPr id="2" name="Titel 1"/>
+          <p:cNvSpPr>
+            <a:spLocks noGrp="1"/>
+          </p:cNvSpPr>
+          <p:nvPr>
+            <p:ph type="title"/>
+          </p:nvPr>
+        </p:nvSpPr>
+        <p:spPr/>
+        <p:txBody>
+          <a:bodyPr/>
+          <a:lstStyle/>
+          <a:p>
+            <a:r>
+              <a:rPr lang="de-DE" dirty="0"/>
               <a:t>Netzwerk NAS</a:t>
             </a:r>
           </a:p>
@@ -8929,7 +9963,7 @@
 </p:sld>
 </file>
 
-<file path=ppt/slides/slide11.xml><?xml version="1.0" encoding="utf-8"?>
+<file path=ppt/slides/slide13.xml><?xml version="1.0" encoding="utf-8"?>
 <p:sld xmlns:a="http://schemas.openxmlformats.org/drawingml/2006/main" xmlns:r="http://schemas.openxmlformats.org/officeDocument/2006/relationships" xmlns:p="http://schemas.openxmlformats.org/presentationml/2006/main">
   <p:cSld>
     <p:spTree>
@@ -9686,7 +10720,7 @@
 </p:sld>
 </file>
 
-<file path=ppt/slides/slide12.xml><?xml version="1.0" encoding="utf-8"?>
+<file path=ppt/slides/slide14.xml><?xml version="1.0" encoding="utf-8"?>
 <p:sld xmlns:a="http://schemas.openxmlformats.org/drawingml/2006/main" xmlns:r="http://schemas.openxmlformats.org/officeDocument/2006/relationships" xmlns:p="http://schemas.openxmlformats.org/presentationml/2006/main">
   <p:cSld>
     <p:spTree>
@@ -10517,7 +11551,7 @@
 </p:sld>
 </file>
 
-<file path=ppt/slides/slide13.xml><?xml version="1.0" encoding="utf-8"?>
+<file path=ppt/slides/slide15.xml><?xml version="1.0" encoding="utf-8"?>
 <p:sld xmlns:a="http://schemas.openxmlformats.org/drawingml/2006/main" xmlns:r="http://schemas.openxmlformats.org/officeDocument/2006/relationships" xmlns:p="http://schemas.openxmlformats.org/presentationml/2006/main">
   <p:cSld>
     <p:spTree>
@@ -10600,7 +11634,7 @@
 </p:sld>
 </file>
 
-<file path=ppt/slides/slide14.xml><?xml version="1.0" encoding="utf-8"?>
+<file path=ppt/slides/slide16.xml><?xml version="1.0" encoding="utf-8"?>
 <p:sld xmlns:a="http://schemas.openxmlformats.org/drawingml/2006/main" xmlns:r="http://schemas.openxmlformats.org/officeDocument/2006/relationships" xmlns:p="http://schemas.openxmlformats.org/presentationml/2006/main">
   <p:cSld>
     <p:spTree>
@@ -11170,7 +12204,7 @@
 </p:sld>
 </file>
 
-<file path=ppt/slides/slide15.xml><?xml version="1.0" encoding="utf-8"?>
+<file path=ppt/slides/slide17.xml><?xml version="1.0" encoding="utf-8"?>
 <p:sld xmlns:a="http://schemas.openxmlformats.org/drawingml/2006/main" xmlns:r="http://schemas.openxmlformats.org/officeDocument/2006/relationships" xmlns:p="http://schemas.openxmlformats.org/presentationml/2006/main">
   <p:cSld>
     <p:spTree>
@@ -11973,7 +13007,7 @@
 </p:sld>
 </file>
 
-<file path=ppt/slides/slide16.xml><?xml version="1.0" encoding="utf-8"?>
+<file path=ppt/slides/slide18.xml><?xml version="1.0" encoding="utf-8"?>
 <p:sld xmlns:a="http://schemas.openxmlformats.org/drawingml/2006/main" xmlns:r="http://schemas.openxmlformats.org/officeDocument/2006/relationships" xmlns:p="http://schemas.openxmlformats.org/presentationml/2006/main">
   <p:cSld>
     <p:spTree>
@@ -12101,7 +13135,7 @@
 </p:sld>
 </file>
 
-<file path=ppt/slides/slide17.xml><?xml version="1.0" encoding="utf-8"?>
+<file path=ppt/slides/slide19.xml><?xml version="1.0" encoding="utf-8"?>
 <p:sld xmlns:a="http://schemas.openxmlformats.org/drawingml/2006/main" xmlns:r="http://schemas.openxmlformats.org/officeDocument/2006/relationships" xmlns:p="http://schemas.openxmlformats.org/presentationml/2006/main">
   <p:cSld>
     <p:spTree>
@@ -12214,7 +13248,113 @@
 </p:sld>
 </file>
 
-<file path=ppt/slides/slide18.xml><?xml version="1.0" encoding="utf-8"?>
+<file path=ppt/slides/slide2.xml><?xml version="1.0" encoding="utf-8"?>
+<p:sld xmlns:a="http://schemas.openxmlformats.org/drawingml/2006/main" xmlns:r="http://schemas.openxmlformats.org/officeDocument/2006/relationships" xmlns:p="http://schemas.openxmlformats.org/presentationml/2006/main">
+  <p:cSld>
+    <p:spTree>
+      <p:nvGrpSpPr>
+        <p:cNvPr id="1" name=""/>
+        <p:cNvGrpSpPr/>
+        <p:nvPr/>
+      </p:nvGrpSpPr>
+      <p:grpSpPr>
+        <a:xfrm>
+          <a:off x="0" y="0"/>
+          <a:ext cx="0" cy="0"/>
+          <a:chOff x="0" y="0"/>
+          <a:chExt cx="0" cy="0"/>
+        </a:xfrm>
+      </p:grpSpPr>
+      <p:sp>
+        <p:nvSpPr>
+          <p:cNvPr id="13" name="Titel 12"/>
+          <p:cNvSpPr>
+            <a:spLocks noGrp="1"/>
+          </p:cNvSpPr>
+          <p:nvPr>
+            <p:ph type="title"/>
+          </p:nvPr>
+        </p:nvSpPr>
+        <p:spPr/>
+        <p:txBody>
+          <a:bodyPr rtlCol="0"/>
+          <a:lstStyle/>
+          <a:p>
+            <a:pPr rtl="0"/>
+            <a:r>
+              <a:rPr lang="de-DE" dirty="0"/>
+              <a:t>Gliederung </a:t>
+            </a:r>
+            <a:endParaRPr lang="en-US" dirty="0"/>
+          </a:p>
+        </p:txBody>
+      </p:sp>
+      <p:sp>
+        <p:nvSpPr>
+          <p:cNvPr id="14" name="Inhaltsplatzhalter 13"/>
+          <p:cNvSpPr>
+            <a:spLocks noGrp="1"/>
+          </p:cNvSpPr>
+          <p:nvPr>
+            <p:ph idx="1"/>
+          </p:nvPr>
+        </p:nvSpPr>
+        <p:spPr/>
+        <p:txBody>
+          <a:bodyPr rtlCol="0"/>
+          <a:lstStyle/>
+          <a:p>
+            <a:pPr rtl="0"/>
+            <a:r>
+              <a:rPr lang="de-DE" dirty="0"/>
+              <a:t>Allgemeine Anforderungen </a:t>
+            </a:r>
+            <a:endParaRPr lang="de" dirty="0"/>
+          </a:p>
+          <a:p>
+            <a:pPr rtl="0"/>
+            <a:r>
+              <a:rPr lang="de-DE" dirty="0"/>
+              <a:t>Angebote</a:t>
+            </a:r>
+            <a:endParaRPr lang="de" dirty="0"/>
+          </a:p>
+          <a:p>
+            <a:pPr rtl="0"/>
+            <a:r>
+              <a:rPr lang="de-DE" dirty="0"/>
+              <a:t>Kalkulationen</a:t>
+            </a:r>
+            <a:endParaRPr lang="en-US" dirty="0"/>
+          </a:p>
+        </p:txBody>
+      </p:sp>
+    </p:spTree>
+    <p:extLst>
+      <p:ext uri="{BB962C8B-B14F-4D97-AF65-F5344CB8AC3E}">
+        <p14:creationId xmlns:p14="http://schemas.microsoft.com/office/powerpoint/2010/main" val="2139132589"/>
+      </p:ext>
+    </p:extLst>
+  </p:cSld>
+  <p:clrMapOvr>
+    <a:masterClrMapping/>
+  </p:clrMapOvr>
+  <mc:AlternateContent xmlns:mc="http://schemas.openxmlformats.org/markup-compatibility/2006" xmlns:p14="http://schemas.microsoft.com/office/powerpoint/2010/main">
+    <mc:Choice Requires="p14">
+      <p:transition spd="med" p14:dur="700">
+        <p:fade/>
+      </p:transition>
+    </mc:Choice>
+    <mc:Fallback xmlns="">
+      <p:transition spd="med">
+        <p:fade/>
+      </p:transition>
+    </mc:Fallback>
+  </mc:AlternateContent>
+</p:sld>
+</file>
+
+<file path=ppt/slides/slide20.xml><?xml version="1.0" encoding="utf-8"?>
 <p:sld xmlns:a="http://schemas.openxmlformats.org/drawingml/2006/main" xmlns:r="http://schemas.openxmlformats.org/officeDocument/2006/relationships" xmlns:p="http://schemas.openxmlformats.org/presentationml/2006/main">
   <p:cSld>
     <p:spTree>
@@ -12317,7 +13457,7 @@
 </p:sld>
 </file>
 
-<file path=ppt/slides/slide19.xml><?xml version="1.0" encoding="utf-8"?>
+<file path=ppt/slides/slide21.xml><?xml version="1.0" encoding="utf-8"?>
 <p:sld xmlns:a="http://schemas.openxmlformats.org/drawingml/2006/main" xmlns:r="http://schemas.openxmlformats.org/officeDocument/2006/relationships" xmlns:p="http://schemas.openxmlformats.org/presentationml/2006/main">
   <p:cSld>
     <p:spTree>
@@ -13247,113 +14387,7 @@
 </p:sld>
 </file>
 
-<file path=ppt/slides/slide2.xml><?xml version="1.0" encoding="utf-8"?>
-<p:sld xmlns:a="http://schemas.openxmlformats.org/drawingml/2006/main" xmlns:r="http://schemas.openxmlformats.org/officeDocument/2006/relationships" xmlns:p="http://schemas.openxmlformats.org/presentationml/2006/main">
-  <p:cSld>
-    <p:spTree>
-      <p:nvGrpSpPr>
-        <p:cNvPr id="1" name=""/>
-        <p:cNvGrpSpPr/>
-        <p:nvPr/>
-      </p:nvGrpSpPr>
-      <p:grpSpPr>
-        <a:xfrm>
-          <a:off x="0" y="0"/>
-          <a:ext cx="0" cy="0"/>
-          <a:chOff x="0" y="0"/>
-          <a:chExt cx="0" cy="0"/>
-        </a:xfrm>
-      </p:grpSpPr>
-      <p:sp>
-        <p:nvSpPr>
-          <p:cNvPr id="13" name="Titel 12"/>
-          <p:cNvSpPr>
-            <a:spLocks noGrp="1"/>
-          </p:cNvSpPr>
-          <p:nvPr>
-            <p:ph type="title"/>
-          </p:nvPr>
-        </p:nvSpPr>
-        <p:spPr/>
-        <p:txBody>
-          <a:bodyPr rtlCol="0"/>
-          <a:lstStyle/>
-          <a:p>
-            <a:pPr rtl="0"/>
-            <a:r>
-              <a:rPr lang="de-DE" dirty="0"/>
-              <a:t>Gliederung </a:t>
-            </a:r>
-            <a:endParaRPr lang="en-US" dirty="0"/>
-          </a:p>
-        </p:txBody>
-      </p:sp>
-      <p:sp>
-        <p:nvSpPr>
-          <p:cNvPr id="14" name="Inhaltsplatzhalter 13"/>
-          <p:cNvSpPr>
-            <a:spLocks noGrp="1"/>
-          </p:cNvSpPr>
-          <p:nvPr>
-            <p:ph idx="1"/>
-          </p:nvPr>
-        </p:nvSpPr>
-        <p:spPr/>
-        <p:txBody>
-          <a:bodyPr rtlCol="0"/>
-          <a:lstStyle/>
-          <a:p>
-            <a:pPr rtl="0"/>
-            <a:r>
-              <a:rPr lang="de-DE" dirty="0"/>
-              <a:t>Allgemeine Anforderungen </a:t>
-            </a:r>
-            <a:endParaRPr lang="de" dirty="0"/>
-          </a:p>
-          <a:p>
-            <a:pPr rtl="0"/>
-            <a:r>
-              <a:rPr lang="de-DE" dirty="0"/>
-              <a:t>Angebote</a:t>
-            </a:r>
-            <a:endParaRPr lang="de" dirty="0"/>
-          </a:p>
-          <a:p>
-            <a:pPr rtl="0"/>
-            <a:r>
-              <a:rPr lang="de-DE" dirty="0"/>
-              <a:t>Kalkulationen</a:t>
-            </a:r>
-            <a:endParaRPr lang="en-US" dirty="0"/>
-          </a:p>
-        </p:txBody>
-      </p:sp>
-    </p:spTree>
-    <p:extLst>
-      <p:ext uri="{BB962C8B-B14F-4D97-AF65-F5344CB8AC3E}">
-        <p14:creationId xmlns:p14="http://schemas.microsoft.com/office/powerpoint/2010/main" val="2139132589"/>
-      </p:ext>
-    </p:extLst>
-  </p:cSld>
-  <p:clrMapOvr>
-    <a:masterClrMapping/>
-  </p:clrMapOvr>
-  <mc:AlternateContent xmlns:mc="http://schemas.openxmlformats.org/markup-compatibility/2006" xmlns:p14="http://schemas.microsoft.com/office/powerpoint/2010/main">
-    <mc:Choice Requires="p14">
-      <p:transition spd="med" p14:dur="700">
-        <p:fade/>
-      </p:transition>
-    </mc:Choice>
-    <mc:Fallback xmlns="">
-      <p:transition spd="med">
-        <p:fade/>
-      </p:transition>
-    </mc:Fallback>
-  </mc:AlternateContent>
-</p:sld>
-</file>
-
-<file path=ppt/slides/slide20.xml><?xml version="1.0" encoding="utf-8"?>
+<file path=ppt/slides/slide22.xml><?xml version="1.0" encoding="utf-8"?>
 <p:sld xmlns:a="http://schemas.openxmlformats.org/drawingml/2006/main" xmlns:r="http://schemas.openxmlformats.org/officeDocument/2006/relationships" xmlns:p="http://schemas.openxmlformats.org/presentationml/2006/main">
   <p:cSld>
     <p:spTree>
@@ -13447,7 +14481,7 @@
 </p:sld>
 </file>
 
-<file path=ppt/slides/slide21.xml><?xml version="1.0" encoding="utf-8"?>
+<file path=ppt/slides/slide23.xml><?xml version="1.0" encoding="utf-8"?>
 <p:sld xmlns:a="http://schemas.openxmlformats.org/drawingml/2006/main" xmlns:r="http://schemas.openxmlformats.org/officeDocument/2006/relationships" xmlns:p="http://schemas.openxmlformats.org/presentationml/2006/main">
   <p:cSld>
     <p:spTree>
@@ -14480,7 +15514,7 @@
 </p:sld>
 </file>
 
-<file path=ppt/slides/slide22.xml><?xml version="1.0" encoding="utf-8"?>
+<file path=ppt/slides/slide24.xml><?xml version="1.0" encoding="utf-8"?>
 <p:sld xmlns:a="http://schemas.openxmlformats.org/drawingml/2006/main" xmlns:r="http://schemas.openxmlformats.org/officeDocument/2006/relationships" xmlns:p="http://schemas.openxmlformats.org/presentationml/2006/main">
   <p:cSld>
     <p:spTree>
@@ -14618,7 +15652,7 @@
 </p:sld>
 </file>
 
-<file path=ppt/slides/slide23.xml><?xml version="1.0" encoding="utf-8"?>
+<file path=ppt/slides/slide25.xml><?xml version="1.0" encoding="utf-8"?>
 <p:sld xmlns:a="http://schemas.openxmlformats.org/drawingml/2006/main" xmlns:r="http://schemas.openxmlformats.org/officeDocument/2006/relationships" xmlns:p="http://schemas.openxmlformats.org/presentationml/2006/main">
   <p:cSld>
     <p:spTree>
@@ -17300,7 +18334,7 @@
       </p:sp>
       <p:pic>
         <p:nvPicPr>
-          <p:cNvPr id="4" name="Grafik 4"/>
+          <p:cNvPr id="8" name="Grafik 8"/>
           <p:cNvPicPr>
             <a:picLocks noGrp="1" noChangeAspect="1"/>
           </p:cNvPicPr>
@@ -17322,14 +18356,67 @@
         </p:blipFill>
         <p:spPr>
           <a:xfrm>
-            <a:off x="2650047" y="1663079"/>
-            <a:ext cx="6716295" cy="5026295"/>
+            <a:off x="680145" y="2061380"/>
+            <a:ext cx="6166952" cy="4618540"/>
           </a:xfrm>
           <a:prstGeom prst="rect">
             <a:avLst/>
           </a:prstGeom>
         </p:spPr>
       </p:pic>
+      <p:sp>
+        <p:nvSpPr>
+          <p:cNvPr id="11" name="Textfeld 10"/>
+          <p:cNvSpPr txBox="1"/>
+          <p:nvPr/>
+        </p:nvSpPr>
+        <p:spPr>
+          <a:xfrm>
+            <a:off x="6847097" y="2568621"/>
+            <a:ext cx="5114167" cy="1754326"/>
+          </a:xfrm>
+          <a:prstGeom prst="rect">
+            <a:avLst/>
+          </a:prstGeom>
+          <a:noFill/>
+        </p:spPr>
+        <p:txBody>
+          <a:bodyPr wrap="square" rtlCol="0">
+            <a:spAutoFit/>
+          </a:bodyPr>
+          <a:lstStyle/>
+          <a:p>
+            <a:pPr algn="l"/>
+            <a:r>
+              <a:rPr lang="en-US" dirty="0"/>
+              <a:t>Ringnetz ist stabil falls ein bereich mal ausfällt</a:t>
+            </a:r>
+          </a:p>
+          <a:p>
+            <a:pPr algn="l"/>
+            <a:endParaRPr lang="en-US" dirty="0"/>
+          </a:p>
+          <a:p>
+            <a:pPr algn="l"/>
+            <a:r>
+              <a:rPr lang="en-US" dirty="0"/>
+              <a:t>Die DMZ und das WLAN sind geschützt durch eine Firewall</a:t>
+            </a:r>
+          </a:p>
+          <a:p>
+            <a:pPr algn="l"/>
+            <a:endParaRPr lang="en-US" dirty="0"/>
+          </a:p>
+          <a:p>
+            <a:pPr algn="l"/>
+            <a:r>
+              <a:rPr lang="en-US" dirty="0"/>
+              <a:t>Der 192.168.1.1 Router ist das InternetGateway</a:t>
+            </a:r>
+            <a:endParaRPr lang="de-DE" dirty="0"/>
+          </a:p>
+        </p:txBody>
+      </p:sp>
     </p:spTree>
     <p:extLst>
       <p:ext uri="{BB962C8B-B14F-4D97-AF65-F5344CB8AC3E}">
@@ -17389,8 +18476,13 @@
           <a:p>
             <a:r>
               <a:rPr lang="de-DE" dirty="0"/>
-              <a:t>Netzwerk Switch</a:t>
-            </a:r>
+              <a:t>Netzwerk</a:t>
+            </a:r>
+            <a:r>
+              <a:rPr lang="en-US" dirty="0"/>
+              <a:t>konfiguration – IP Telefon</a:t>
+            </a:r>
+            <a:endParaRPr lang="de-DE" dirty="0"/>
           </a:p>
         </p:txBody>
       </p:sp>
@@ -17406,61 +18498,115 @@
         </p:nvSpPr>
         <p:spPr/>
         <p:txBody>
-          <a:bodyPr/>
+          <a:bodyPr>
+            <a:normAutofit lnSpcReduction="10000"/>
+          </a:bodyPr>
           <a:lstStyle/>
           <a:p>
+            <a:pPr marL="0" indent="0">
+              <a:buNone/>
+            </a:pPr>
             <a:r>
               <a:rPr lang="en-US" dirty="0"/>
-              <a:t>HP Gigabit Switch 1820-24G (J9980A)</a:t>
-            </a:r>
-          </a:p>
-          <a:p>
-            <a:pPr lvl="1"/>
-            <a:r>
-              <a:rPr lang="de-DE" b="1" dirty="0"/>
-              <a:t>24</a:t>
-            </a:r>
-            <a:r>
-              <a:rPr lang="de-DE" dirty="0"/>
-              <a:t>x Ethernet, </a:t>
-            </a:r>
-            <a:r>
-              <a:rPr lang="de-DE" b="1" dirty="0"/>
-              <a:t>2</a:t>
-            </a:r>
-            <a:r>
-              <a:rPr lang="de-DE" dirty="0"/>
-              <a:t>x DFP Anschlüssen.</a:t>
-            </a:r>
-          </a:p>
-          <a:p>
-            <a:pPr lvl="1"/>
-            <a:r>
-              <a:rPr lang="de-DE" dirty="0"/>
-              <a:t>52 </a:t>
-            </a:r>
-            <a:r>
-              <a:rPr lang="de-DE" dirty="0" err="1"/>
-              <a:t>Gbps</a:t>
-            </a:r>
-            <a:r>
-              <a:rPr lang="de-DE" dirty="0"/>
-              <a:t> Kapazität.</a:t>
-            </a:r>
-          </a:p>
-          <a:p>
-            <a:pPr lvl="1"/>
-            <a:r>
-              <a:rPr lang="de-DE" dirty="0"/>
-              <a:t>22W Leistung (Last).</a:t>
+              <a:t>Placetel.de – Placetel PROFI Complete</a:t>
+            </a:r>
+          </a:p>
+          <a:p>
+            <a:pPr marL="0" indent="0">
+              <a:buNone/>
+            </a:pPr>
+            <a:r>
+              <a:rPr lang="en-US" dirty="0"/>
+              <a:t>Kosten: 13,90€ im Monat</a:t>
+            </a:r>
+          </a:p>
+          <a:p>
+            <a:pPr marL="0" indent="0">
+              <a:buNone/>
+            </a:pPr>
+            <a:endParaRPr lang="en-US" dirty="0"/>
+          </a:p>
+          <a:p>
+            <a:pPr marL="0" indent="0">
+              <a:buNone/>
+            </a:pPr>
+            <a:r>
+              <a:rPr lang="en-US" dirty="0"/>
+              <a:t>- AllnetFlat in Deutschland</a:t>
+            </a:r>
+          </a:p>
+          <a:p>
+            <a:pPr marL="0" indent="0">
+              <a:buNone/>
+            </a:pPr>
+            <a:r>
+              <a:rPr lang="en-US" dirty="0"/>
+              <a:t>- Fax, Konferenzen, Sprachmenü</a:t>
+            </a:r>
+          </a:p>
+          <a:p>
+            <a:pPr>
+              <a:buFontTx/>
+              <a:buChar char="-"/>
+            </a:pPr>
+            <a:r>
+              <a:rPr lang="en-US" dirty="0"/>
+              <a:t>Und inklusive einem IP-Telefon (weitere sind auch bestellbar)</a:t>
+            </a:r>
+          </a:p>
+          <a:p>
+            <a:pPr>
+              <a:buFontTx/>
+              <a:buChar char="-"/>
+            </a:pPr>
+            <a:endParaRPr lang="en-US" dirty="0"/>
+          </a:p>
+          <a:p>
+            <a:pPr>
+              <a:buFontTx/>
+              <a:buChar char="-"/>
+            </a:pPr>
+            <a:r>
+              <a:rPr lang="en-US" dirty="0"/>
+              <a:t>Die Telefone werden über einen PoE Switch mit Energie versorgt</a:t>
             </a:r>
           </a:p>
         </p:txBody>
       </p:sp>
+      <p:pic>
+        <p:nvPicPr>
+          <p:cNvPr id="4" name="Grafik 4"/>
+          <p:cNvPicPr>
+            <a:picLocks noChangeAspect="1"/>
+          </p:cNvPicPr>
+          <p:nvPr/>
+        </p:nvPicPr>
+        <p:blipFill>
+          <a:blip r:embed="rId2">
+            <a:extLst>
+              <a:ext uri="{28A0092B-C50C-407E-A947-70E740481C1C}">
+                <a14:useLocalDpi xmlns:a14="http://schemas.microsoft.com/office/drawing/2010/main" val="0"/>
+              </a:ext>
+            </a:extLst>
+          </a:blip>
+          <a:stretch>
+            <a:fillRect/>
+          </a:stretch>
+        </p:blipFill>
+        <p:spPr>
+          <a:xfrm>
+            <a:off x="7618981" y="1698131"/>
+            <a:ext cx="2438400" cy="2438400"/>
+          </a:xfrm>
+          <a:prstGeom prst="rect">
+            <a:avLst/>
+          </a:prstGeom>
+        </p:spPr>
+      </p:pic>
     </p:spTree>
     <p:extLst>
       <p:ext uri="{BB962C8B-B14F-4D97-AF65-F5344CB8AC3E}">
-        <p14:creationId xmlns:p14="http://schemas.microsoft.com/office/powerpoint/2010/main" val="1943243209"/>
+        <p14:creationId xmlns:p14="http://schemas.microsoft.com/office/powerpoint/2010/main" val="1022958868"/>
       </p:ext>
     </p:extLst>
   </p:cSld>
@@ -17518,591 +18664,155 @@
               <a:rPr lang="de-DE" dirty="0"/>
               <a:t>Netzwerk</a:t>
             </a:r>
+            <a:r>
+              <a:rPr lang="en-US" dirty="0"/>
+              <a:t>konfiguration – Router und Switch</a:t>
+            </a:r>
+            <a:endParaRPr lang="de-DE" dirty="0"/>
           </a:p>
         </p:txBody>
       </p:sp>
-      <p:graphicFrame>
-        <p:nvGraphicFramePr>
-          <p:cNvPr id="5" name="Tabelle 4"/>
-          <p:cNvGraphicFramePr>
-            <a:graphicFrameLocks noGrp="1"/>
-          </p:cNvGraphicFramePr>
+      <p:sp>
+        <p:nvSpPr>
+          <p:cNvPr id="3" name="Inhaltsplatzhalter 2"/>
+          <p:cNvSpPr>
+            <a:spLocks noGrp="1"/>
+          </p:cNvSpPr>
           <p:nvPr>
-            <p:extLst>
-              <p:ext uri="{D42A27DB-BD31-4B8C-83A1-F6EECF244321}">
-                <p14:modId xmlns:p14="http://schemas.microsoft.com/office/powerpoint/2010/main" val="3295671181"/>
-              </p:ext>
-            </p:extLst>
+            <p:ph idx="1"/>
           </p:nvPr>
-        </p:nvGraphicFramePr>
-        <p:xfrm>
-          <a:off x="1197868" y="2132856"/>
-          <a:ext cx="8815470" cy="4465143"/>
-        </p:xfrm>
-        <a:graphic>
-          <a:graphicData uri="http://schemas.openxmlformats.org/drawingml/2006/table">
-            <a:tbl>
-              <a:tblPr firstRow="1" bandRow="1">
-                <a:tableStyleId>{5C22544A-7EE6-4342-B048-85BDC9FD1C3A}</a:tableStyleId>
-              </a:tblPr>
-              <a:tblGrid>
-                <a:gridCol w="2938490">
-                  <a:extLst>
-                    <a:ext uri="{9D8B030D-6E8A-4147-A177-3AD203B41FA5}">
-                      <a16:colId xmlns:a16="http://schemas.microsoft.com/office/drawing/2014/main" val="20000"/>
-                    </a:ext>
-                  </a:extLst>
-                </a:gridCol>
-                <a:gridCol w="2938490">
-                  <a:extLst>
-                    <a:ext uri="{9D8B030D-6E8A-4147-A177-3AD203B41FA5}">
-                      <a16:colId xmlns:a16="http://schemas.microsoft.com/office/drawing/2014/main" val="20001"/>
-                    </a:ext>
-                  </a:extLst>
-                </a:gridCol>
-                <a:gridCol w="2938490">
-                  <a:extLst>
-                    <a:ext uri="{9D8B030D-6E8A-4147-A177-3AD203B41FA5}">
-                      <a16:colId xmlns:a16="http://schemas.microsoft.com/office/drawing/2014/main" val="20002"/>
-                    </a:ext>
-                  </a:extLst>
-                </a:gridCol>
-              </a:tblGrid>
-              <a:tr h="495165">
-                <a:tc>
-                  <a:txBody>
-                    <a:bodyPr/>
-                    <a:lstStyle/>
-                    <a:p>
-                      <a:r>
-                        <a:rPr lang="de-DE" dirty="0"/>
-                        <a:t>Typ</a:t>
-                      </a:r>
-                    </a:p>
-                  </a:txBody>
-                  <a:tcPr/>
-                </a:tc>
-                <a:tc>
-                  <a:txBody>
-                    <a:bodyPr/>
-                    <a:lstStyle/>
-                    <a:p>
-                      <a:r>
-                        <a:rPr lang="de-DE" dirty="0"/>
-                        <a:t>Model</a:t>
-                      </a:r>
-                    </a:p>
-                  </a:txBody>
-                  <a:tcPr>
-                    <a:lnB w="12700" cap="flat" cmpd="sng" algn="ctr">
-                      <a:solidFill>
-                        <a:schemeClr val="tx1"/>
-                      </a:solidFill>
-                      <a:prstDash val="solid"/>
-                      <a:round/>
-                      <a:headEnd type="none" w="med" len="med"/>
-                      <a:tailEnd type="none" w="med" len="med"/>
-                    </a:lnB>
-                  </a:tcPr>
-                </a:tc>
-                <a:tc>
-                  <a:txBody>
-                    <a:bodyPr/>
-                    <a:lstStyle/>
-                    <a:p>
-                      <a:r>
-                        <a:rPr lang="de-DE" dirty="0"/>
-                        <a:t>Preis</a:t>
-                      </a:r>
-                    </a:p>
-                  </a:txBody>
-                  <a:tcPr>
-                    <a:lnB w="12700" cap="flat" cmpd="sng" algn="ctr">
-                      <a:solidFill>
-                        <a:schemeClr val="tx1"/>
-                      </a:solidFill>
-                      <a:prstDash val="solid"/>
-                      <a:round/>
-                      <a:headEnd type="none" w="med" len="med"/>
-                      <a:tailEnd type="none" w="med" len="med"/>
-                    </a:lnB>
-                  </a:tcPr>
-                </a:tc>
-                <a:extLst>
-                  <a:ext uri="{0D108BD9-81ED-4DB2-BD59-A6C34878D82A}">
-                    <a16:rowId xmlns:a16="http://schemas.microsoft.com/office/drawing/2014/main" val="10000"/>
-                  </a:ext>
-                </a:extLst>
-              </a:tr>
-              <a:tr h="495165">
-                <a:tc>
-                  <a:txBody>
-                    <a:bodyPr/>
-                    <a:lstStyle/>
-                    <a:p>
-                      <a:pPr marL="0" marR="0" indent="0" algn="l" defTabSz="914126" rtl="0" eaLnBrk="1" fontAlgn="auto" latinLnBrk="0" hangingPunct="1">
-                        <a:lnSpc>
-                          <a:spcPct val="100000"/>
-                        </a:lnSpc>
-                        <a:spcBef>
-                          <a:spcPts val="0"/>
-                        </a:spcBef>
-                        <a:spcAft>
-                          <a:spcPts val="0"/>
-                        </a:spcAft>
-                        <a:buClrTx/>
-                        <a:buSzTx/>
-                        <a:buFontTx/>
-                        <a:buNone/>
-                        <a:tabLst/>
-                        <a:defRPr/>
-                      </a:pPr>
-                      <a:r>
-                        <a:rPr lang="de-DE" sz="1799" b="0" i="0" u="none" strike="noStrike" kern="1200" dirty="0">
-                          <a:solidFill>
-                            <a:schemeClr val="dk1"/>
-                          </a:solidFill>
-                          <a:effectLst/>
-                          <a:latin typeface="+mn-lt"/>
-                          <a:ea typeface="+mn-ea"/>
-                          <a:cs typeface="+mn-cs"/>
-                        </a:rPr>
-                        <a:t>Switch</a:t>
-                      </a:r>
-                      <a:endParaRPr lang="de-DE" b="1" dirty="0">
-                        <a:effectLst/>
-                      </a:endParaRPr>
-                    </a:p>
-                  </a:txBody>
-                  <a:tcPr>
-                    <a:lnR w="12700" cap="flat" cmpd="sng" algn="ctr">
-                      <a:solidFill>
-                        <a:schemeClr val="tx1"/>
-                      </a:solidFill>
-                      <a:prstDash val="solid"/>
-                      <a:round/>
-                      <a:headEnd type="none" w="med" len="med"/>
-                      <a:tailEnd type="none" w="med" len="med"/>
-                    </a:lnR>
-                  </a:tcPr>
-                </a:tc>
-                <a:tc>
-                  <a:txBody>
-                    <a:bodyPr/>
-                    <a:lstStyle/>
-                    <a:p>
-                      <a:pPr marL="0" marR="0" indent="0" algn="l" defTabSz="914126" rtl="0" eaLnBrk="1" fontAlgn="auto" latinLnBrk="0" hangingPunct="1">
-                        <a:lnSpc>
-                          <a:spcPct val="100000"/>
-                        </a:lnSpc>
-                        <a:spcBef>
-                          <a:spcPts val="0"/>
-                        </a:spcBef>
-                        <a:spcAft>
-                          <a:spcPts val="0"/>
-                        </a:spcAft>
-                        <a:buClrTx/>
-                        <a:buSzTx/>
-                        <a:buFontTx/>
-                        <a:buNone/>
-                        <a:tabLst/>
-                        <a:defRPr/>
-                      </a:pPr>
-                      <a:r>
-                        <a:rPr lang="en-US" dirty="0"/>
-                        <a:t>HP Gigabit Switch 1820-24G (J9980A)</a:t>
-                      </a:r>
-                    </a:p>
-                  </a:txBody>
-                  <a:tcPr>
-                    <a:lnL w="12700" cap="flat" cmpd="sng" algn="ctr">
-                      <a:solidFill>
-                        <a:schemeClr val="tx1"/>
-                      </a:solidFill>
-                      <a:prstDash val="solid"/>
-                      <a:round/>
-                      <a:headEnd type="none" w="med" len="med"/>
-                      <a:tailEnd type="none" w="med" len="med"/>
-                    </a:lnL>
-                    <a:lnR w="12700" cap="flat" cmpd="sng" algn="ctr">
-                      <a:solidFill>
-                        <a:schemeClr val="tx1"/>
-                      </a:solidFill>
-                      <a:prstDash val="solid"/>
-                      <a:round/>
-                      <a:headEnd type="none" w="med" len="med"/>
-                      <a:tailEnd type="none" w="med" len="med"/>
-                    </a:lnR>
-                    <a:lnT w="12700" cap="flat" cmpd="sng" algn="ctr">
-                      <a:solidFill>
-                        <a:schemeClr val="tx1"/>
-                      </a:solidFill>
-                      <a:prstDash val="solid"/>
-                      <a:round/>
-                      <a:headEnd type="none" w="med" len="med"/>
-                      <a:tailEnd type="none" w="med" len="med"/>
-                    </a:lnT>
-                    <a:lnB w="12700" cap="flat" cmpd="sng" algn="ctr">
-                      <a:solidFill>
-                        <a:schemeClr val="tx1"/>
-                      </a:solidFill>
-                      <a:prstDash val="solid"/>
-                      <a:round/>
-                      <a:headEnd type="none" w="med" len="med"/>
-                      <a:tailEnd type="none" w="med" len="med"/>
-                    </a:lnB>
-                  </a:tcPr>
-                </a:tc>
-                <a:tc>
-                  <a:txBody>
-                    <a:bodyPr/>
-                    <a:lstStyle/>
-                    <a:p>
-                      <a:endParaRPr lang="de-DE" dirty="0"/>
-                    </a:p>
-                  </a:txBody>
-                  <a:tcPr>
-                    <a:lnL w="12700" cap="flat" cmpd="sng" algn="ctr">
-                      <a:solidFill>
-                        <a:schemeClr val="tx1"/>
-                      </a:solidFill>
-                      <a:prstDash val="solid"/>
-                      <a:round/>
-                      <a:headEnd type="none" w="med" len="med"/>
-                      <a:tailEnd type="none" w="med" len="med"/>
-                    </a:lnL>
-                    <a:lnT w="12700" cap="flat" cmpd="sng" algn="ctr">
-                      <a:solidFill>
-                        <a:schemeClr val="tx1"/>
-                      </a:solidFill>
-                      <a:prstDash val="solid"/>
-                      <a:round/>
-                      <a:headEnd type="none" w="med" len="med"/>
-                      <a:tailEnd type="none" w="med" len="med"/>
-                    </a:lnT>
-                  </a:tcPr>
-                </a:tc>
-                <a:extLst>
-                  <a:ext uri="{0D108BD9-81ED-4DB2-BD59-A6C34878D82A}">
-                    <a16:rowId xmlns:a16="http://schemas.microsoft.com/office/drawing/2014/main" val="10001"/>
-                  </a:ext>
-                </a:extLst>
-              </a:tr>
-              <a:tr h="495165">
-                <a:tc>
-                  <a:txBody>
-                    <a:bodyPr/>
-                    <a:lstStyle/>
-                    <a:p>
-                      <a:endParaRPr lang="de-DE" i="1" dirty="0"/>
-                    </a:p>
-                  </a:txBody>
-                  <a:tcPr/>
-                </a:tc>
-                <a:tc>
-                  <a:txBody>
-                    <a:bodyPr/>
-                    <a:lstStyle/>
-                    <a:p>
-                      <a:endParaRPr lang="de-DE" dirty="0"/>
-                    </a:p>
-                  </a:txBody>
-                  <a:tcPr>
-                    <a:lnT w="12700" cap="flat" cmpd="sng" algn="ctr">
-                      <a:solidFill>
-                        <a:schemeClr val="tx1"/>
-                      </a:solidFill>
-                      <a:prstDash val="solid"/>
-                      <a:round/>
-                      <a:headEnd type="none" w="med" len="med"/>
-                      <a:tailEnd type="none" w="med" len="med"/>
-                    </a:lnT>
-                  </a:tcPr>
-                </a:tc>
-                <a:tc>
-                  <a:txBody>
-                    <a:bodyPr/>
-                    <a:lstStyle/>
-                    <a:p>
-                      <a:endParaRPr lang="de-DE"/>
-                    </a:p>
-                  </a:txBody>
-                  <a:tcPr/>
-                </a:tc>
-                <a:extLst>
-                  <a:ext uri="{0D108BD9-81ED-4DB2-BD59-A6C34878D82A}">
-                    <a16:rowId xmlns:a16="http://schemas.microsoft.com/office/drawing/2014/main" val="10002"/>
-                  </a:ext>
-                </a:extLst>
-              </a:tr>
-              <a:tr h="495165">
-                <a:tc>
-                  <a:txBody>
-                    <a:bodyPr/>
-                    <a:lstStyle/>
-                    <a:p>
-                      <a:endParaRPr lang="de-DE" dirty="0"/>
-                    </a:p>
-                  </a:txBody>
-                  <a:tcPr/>
-                </a:tc>
-                <a:tc>
-                  <a:txBody>
-                    <a:bodyPr/>
-                    <a:lstStyle/>
-                    <a:p>
-                      <a:endParaRPr lang="de-DE"/>
-                    </a:p>
-                  </a:txBody>
-                  <a:tcPr/>
-                </a:tc>
-                <a:tc>
-                  <a:txBody>
-                    <a:bodyPr/>
-                    <a:lstStyle/>
-                    <a:p>
-                      <a:endParaRPr lang="de-DE"/>
-                    </a:p>
-                  </a:txBody>
-                  <a:tcPr/>
-                </a:tc>
-                <a:extLst>
-                  <a:ext uri="{0D108BD9-81ED-4DB2-BD59-A6C34878D82A}">
-                    <a16:rowId xmlns:a16="http://schemas.microsoft.com/office/drawing/2014/main" val="10003"/>
-                  </a:ext>
-                </a:extLst>
-              </a:tr>
-              <a:tr h="854327">
-                <a:tc>
-                  <a:txBody>
-                    <a:bodyPr/>
-                    <a:lstStyle/>
-                    <a:p>
-                      <a:endParaRPr lang="de-DE" dirty="0"/>
-                    </a:p>
-                  </a:txBody>
-                  <a:tcPr/>
-                </a:tc>
-                <a:tc>
-                  <a:txBody>
-                    <a:bodyPr/>
-                    <a:lstStyle/>
-                    <a:p>
-                      <a:endParaRPr lang="de-DE" dirty="0"/>
-                    </a:p>
-                  </a:txBody>
-                  <a:tcPr/>
-                </a:tc>
-                <a:tc>
-                  <a:txBody>
-                    <a:bodyPr/>
-                    <a:lstStyle/>
-                    <a:p>
-                      <a:endParaRPr lang="de-DE" dirty="0"/>
-                    </a:p>
-                  </a:txBody>
-                  <a:tcPr/>
-                </a:tc>
-                <a:extLst>
-                  <a:ext uri="{0D108BD9-81ED-4DB2-BD59-A6C34878D82A}">
-                    <a16:rowId xmlns:a16="http://schemas.microsoft.com/office/drawing/2014/main" val="10004"/>
-                  </a:ext>
-                </a:extLst>
-              </a:tr>
-              <a:tr h="495165">
-                <a:tc>
-                  <a:txBody>
-                    <a:bodyPr/>
-                    <a:lstStyle/>
-                    <a:p>
-                      <a:endParaRPr lang="de-DE" dirty="0"/>
-                    </a:p>
-                  </a:txBody>
-                  <a:tcPr/>
-                </a:tc>
-                <a:tc>
-                  <a:txBody>
-                    <a:bodyPr/>
-                    <a:lstStyle/>
-                    <a:p>
-                      <a:endParaRPr lang="de-DE"/>
-                    </a:p>
-                  </a:txBody>
-                  <a:tcPr/>
-                </a:tc>
-                <a:tc>
-                  <a:txBody>
-                    <a:bodyPr/>
-                    <a:lstStyle/>
-                    <a:p>
-                      <a:endParaRPr lang="de-DE" dirty="0"/>
-                    </a:p>
-                  </a:txBody>
-                  <a:tcPr/>
-                </a:tc>
-                <a:extLst>
-                  <a:ext uri="{0D108BD9-81ED-4DB2-BD59-A6C34878D82A}">
-                    <a16:rowId xmlns:a16="http://schemas.microsoft.com/office/drawing/2014/main" val="10005"/>
-                  </a:ext>
-                </a:extLst>
-              </a:tr>
-              <a:tr h="495165">
-                <a:tc>
-                  <a:txBody>
-                    <a:bodyPr/>
-                    <a:lstStyle/>
-                    <a:p>
-                      <a:endParaRPr lang="de-DE" dirty="0"/>
-                    </a:p>
-                  </a:txBody>
-                  <a:tcPr/>
-                </a:tc>
-                <a:tc>
-                  <a:txBody>
-                    <a:bodyPr/>
-                    <a:lstStyle/>
-                    <a:p>
-                      <a:endParaRPr lang="de-DE"/>
-                    </a:p>
-                  </a:txBody>
-                  <a:tcPr/>
-                </a:tc>
-                <a:tc>
-                  <a:txBody>
-                    <a:bodyPr/>
-                    <a:lstStyle/>
-                    <a:p>
-                      <a:endParaRPr lang="de-DE" dirty="0"/>
-                    </a:p>
-                  </a:txBody>
-                  <a:tcPr/>
-                </a:tc>
-                <a:extLst>
-                  <a:ext uri="{0D108BD9-81ED-4DB2-BD59-A6C34878D82A}">
-                    <a16:rowId xmlns:a16="http://schemas.microsoft.com/office/drawing/2014/main" val="10006"/>
-                  </a:ext>
-                </a:extLst>
-              </a:tr>
-              <a:tr h="495165">
-                <a:tc>
-                  <a:txBody>
-                    <a:bodyPr/>
-                    <a:lstStyle/>
-                    <a:p>
-                      <a:endParaRPr lang="de-DE" dirty="0"/>
-                    </a:p>
-                  </a:txBody>
-                  <a:tcPr/>
-                </a:tc>
-                <a:tc>
-                  <a:txBody>
-                    <a:bodyPr/>
-                    <a:lstStyle/>
-                    <a:p>
-                      <a:endParaRPr lang="de-DE" dirty="0"/>
-                    </a:p>
-                  </a:txBody>
-                  <a:tcPr/>
-                </a:tc>
-                <a:tc>
-                  <a:txBody>
-                    <a:bodyPr/>
-                    <a:lstStyle/>
-                    <a:p>
-                      <a:endParaRPr lang="de-DE" dirty="0"/>
-                    </a:p>
-                  </a:txBody>
-                  <a:tcPr/>
-                </a:tc>
-                <a:extLst>
-                  <a:ext uri="{0D108BD9-81ED-4DB2-BD59-A6C34878D82A}">
-                    <a16:rowId xmlns:a16="http://schemas.microsoft.com/office/drawing/2014/main" val="10007"/>
-                  </a:ext>
-                </a:extLst>
-              </a:tr>
-            </a:tbl>
-          </a:graphicData>
-        </a:graphic>
-      </p:graphicFrame>
-      <p:sp>
-        <p:nvSpPr>
-          <p:cNvPr id="4" name="Textfeld 3"/>
-          <p:cNvSpPr txBox="1"/>
-          <p:nvPr/>
         </p:nvSpPr>
         <p:spPr>
           <a:xfrm>
-            <a:off x="7102524" y="2780928"/>
-            <a:ext cx="2736304" cy="369332"/>
+            <a:off x="680145" y="2336873"/>
+            <a:ext cx="7153101" cy="3599316"/>
+          </a:xfrm>
+        </p:spPr>
+        <p:txBody>
+          <a:bodyPr>
+            <a:normAutofit/>
+          </a:bodyPr>
+          <a:lstStyle/>
+          <a:p>
+            <a:pPr marL="0" indent="0">
+              <a:buNone/>
+            </a:pPr>
+            <a:r>
+              <a:rPr lang="en-US" dirty="0"/>
+              <a:t>Router: ZyXel ZyWall USG 100 (kosten ca. 300€)</a:t>
+            </a:r>
+          </a:p>
+          <a:p>
+            <a:pPr>
+              <a:buFontTx/>
+              <a:buChar char="-"/>
+            </a:pPr>
+            <a:r>
+              <a:rPr lang="en-US" dirty="0"/>
+              <a:t>5 GigabitEthernetports für die Subnetze, inklusive DMZ</a:t>
+            </a:r>
+          </a:p>
+          <a:p>
+            <a:pPr>
+              <a:buFontTx/>
+              <a:buChar char="-"/>
+            </a:pPr>
+            <a:r>
+              <a:rPr lang="en-US" dirty="0"/>
+              <a:t>Inklusive Firewall und ZyXel AntiVirus</a:t>
+            </a:r>
+          </a:p>
+          <a:p>
+            <a:pPr>
+              <a:buFontTx/>
+              <a:buChar char="-"/>
+            </a:pPr>
+            <a:endParaRPr lang="en-US" dirty="0"/>
+          </a:p>
+          <a:p>
+            <a:pPr marL="0" indent="0">
+              <a:buNone/>
+            </a:pPr>
+            <a:r>
+              <a:rPr lang="en-US" dirty="0"/>
+              <a:t>Switch für IP Telefone: DGS 1210-24P PoE Switch (kosten ca. 350€)</a:t>
+            </a:r>
+          </a:p>
+          <a:p>
+            <a:pPr marL="0" indent="0">
+              <a:buNone/>
+            </a:pPr>
+            <a:r>
+              <a:rPr lang="en-US" dirty="0"/>
+              <a:t>- 24 PoE Ports um die Telefone im Büro mit Strom zu versorgen</a:t>
+            </a:r>
+          </a:p>
+        </p:txBody>
+      </p:sp>
+      <p:pic>
+        <p:nvPicPr>
+          <p:cNvPr id="5" name="Grafik 5"/>
+          <p:cNvPicPr>
+            <a:picLocks noChangeAspect="1"/>
+          </p:cNvPicPr>
+          <p:nvPr/>
+        </p:nvPicPr>
+        <p:blipFill>
+          <a:blip r:embed="rId2">
+            <a:extLst>
+              <a:ext uri="{28A0092B-C50C-407E-A947-70E740481C1C}">
+                <a14:useLocalDpi xmlns:a14="http://schemas.microsoft.com/office/drawing/2010/main" val="0"/>
+              </a:ext>
+            </a:extLst>
+          </a:blip>
+          <a:stretch>
+            <a:fillRect/>
+          </a:stretch>
+        </p:blipFill>
+        <p:spPr>
+          <a:xfrm>
+            <a:off x="7935195" y="1118588"/>
+            <a:ext cx="3682540" cy="3682540"/>
           </a:xfrm>
           <a:prstGeom prst="rect">
             <a:avLst/>
           </a:prstGeom>
-          <a:noFill/>
         </p:spPr>
-        <p:txBody>
-          <a:bodyPr wrap="square" rtlCol="0">
-            <a:spAutoFit/>
-          </a:bodyPr>
-          <a:lstStyle/>
-          <a:p>
-            <a:r>
-              <a:rPr lang="el-GR" sz="1799" dirty="0">
-                <a:solidFill>
-                  <a:schemeClr val="bg1"/>
-                </a:solidFill>
-              </a:rPr>
-              <a:t>Σ</a:t>
-            </a:r>
-            <a:r>
-              <a:rPr lang="de-DE" sz="1799" dirty="0">
-                <a:solidFill>
-                  <a:schemeClr val="bg1"/>
-                </a:solidFill>
-              </a:rPr>
-              <a:t> 145,31€</a:t>
-            </a:r>
-            <a:endParaRPr lang="de-DE" dirty="0"/>
-          </a:p>
-        </p:txBody>
-      </p:sp>
-      <p:sp>
-        <p:nvSpPr>
-          <p:cNvPr id="6" name="Textfeld 5"/>
-          <p:cNvSpPr txBox="1"/>
+      </p:pic>
+      <p:pic>
+        <p:nvPicPr>
+          <p:cNvPr id="7" name="Grafik 7"/>
+          <p:cNvPicPr>
+            <a:picLocks noChangeAspect="1"/>
+          </p:cNvPicPr>
           <p:nvPr/>
-        </p:nvSpPr>
+        </p:nvPicPr>
+        <p:blipFill>
+          <a:blip r:embed="rId3">
+            <a:extLst>
+              <a:ext uri="{28A0092B-C50C-407E-A947-70E740481C1C}">
+                <a14:useLocalDpi xmlns:a14="http://schemas.microsoft.com/office/drawing/2010/main" val="0"/>
+              </a:ext>
+            </a:extLst>
+          </a:blip>
+          <a:stretch>
+            <a:fillRect/>
+          </a:stretch>
+        </p:blipFill>
         <p:spPr>
           <a:xfrm>
-            <a:off x="1269876" y="3284984"/>
-            <a:ext cx="2520280" cy="369332"/>
+            <a:off x="7935195" y="4144266"/>
+            <a:ext cx="3809524" cy="2044444"/>
           </a:xfrm>
           <a:prstGeom prst="rect">
             <a:avLst/>
           </a:prstGeom>
-          <a:noFill/>
         </p:spPr>
-        <p:txBody>
-          <a:bodyPr wrap="square" rtlCol="0">
-            <a:spAutoFit/>
-          </a:bodyPr>
-          <a:lstStyle/>
-          <a:p>
-            <a:r>
-              <a:rPr lang="de-DE" dirty="0">
-                <a:solidFill>
-                  <a:schemeClr val="bg1"/>
-                </a:solidFill>
-              </a:rPr>
-              <a:t>NAS</a:t>
-            </a:r>
-          </a:p>
-        </p:txBody>
-      </p:sp>
+      </p:pic>
     </p:spTree>
     <p:extLst>
       <p:ext uri="{BB962C8B-B14F-4D97-AF65-F5344CB8AC3E}">
-        <p14:creationId xmlns:p14="http://schemas.microsoft.com/office/powerpoint/2010/main" val="1813666035"/>
+        <p14:creationId xmlns:p14="http://schemas.microsoft.com/office/powerpoint/2010/main" val="541302740"/>
       </p:ext>
     </p:extLst>
   </p:cSld>
@@ -18121,233 +18831,6 @@
       </p:transition>
     </mc:Fallback>
   </mc:AlternateContent>
-  <p:timing>
-    <p:tnLst>
-      <p:par>
-        <p:cTn id="1" dur="indefinite" restart="never" nodeType="tmRoot">
-          <p:childTnLst>
-            <p:seq concurrent="1" nextAc="seek">
-              <p:cTn id="2" dur="indefinite" nodeType="mainSeq">
-                <p:childTnLst>
-                  <p:par>
-                    <p:cTn id="3" fill="hold">
-                      <p:stCondLst>
-                        <p:cond delay="indefinite"/>
-                      </p:stCondLst>
-                      <p:childTnLst>
-                        <p:par>
-                          <p:cTn id="4" fill="hold">
-                            <p:stCondLst>
-                              <p:cond delay="0"/>
-                            </p:stCondLst>
-                            <p:childTnLst>
-                              <p:par>
-                                <p:cTn id="5" presetID="2" presetClass="entr" presetSubtype="4" fill="hold" grpId="0" nodeType="clickEffect">
-                                  <p:stCondLst>
-                                    <p:cond delay="0"/>
-                                  </p:stCondLst>
-                                  <p:childTnLst>
-                                    <p:set>
-                                      <p:cBhvr>
-                                        <p:cTn id="6" dur="1" fill="hold">
-                                          <p:stCondLst>
-                                            <p:cond delay="0"/>
-                                          </p:stCondLst>
-                                        </p:cTn>
-                                        <p:tgtEl>
-                                          <p:spTgt spid="4"/>
-                                        </p:tgtEl>
-                                        <p:attrNameLst>
-                                          <p:attrName>style.visibility</p:attrName>
-                                        </p:attrNameLst>
-                                      </p:cBhvr>
-                                      <p:to>
-                                        <p:strVal val="visible"/>
-                                      </p:to>
-                                    </p:set>
-                                    <p:anim calcmode="lin" valueType="num">
-                                      <p:cBhvr additive="base">
-                                        <p:cTn id="7" dur="500" fill="hold"/>
-                                        <p:tgtEl>
-                                          <p:spTgt spid="4"/>
-                                        </p:tgtEl>
-                                        <p:attrNameLst>
-                                          <p:attrName>ppt_x</p:attrName>
-                                        </p:attrNameLst>
-                                      </p:cBhvr>
-                                      <p:tavLst>
-                                        <p:tav tm="0">
-                                          <p:val>
-                                            <p:strVal val="#ppt_x"/>
-                                          </p:val>
-                                        </p:tav>
-                                        <p:tav tm="100000">
-                                          <p:val>
-                                            <p:strVal val="#ppt_x"/>
-                                          </p:val>
-                                        </p:tav>
-                                      </p:tavLst>
-                                    </p:anim>
-                                    <p:anim calcmode="lin" valueType="num">
-                                      <p:cBhvr additive="base">
-                                        <p:cTn id="8" dur="500" fill="hold"/>
-                                        <p:tgtEl>
-                                          <p:spTgt spid="4"/>
-                                        </p:tgtEl>
-                                        <p:attrNameLst>
-                                          <p:attrName>ppt_y</p:attrName>
-                                        </p:attrNameLst>
-                                      </p:cBhvr>
-                                      <p:tavLst>
-                                        <p:tav tm="0">
-                                          <p:val>
-                                            <p:strVal val="1+#ppt_h/2"/>
-                                          </p:val>
-                                        </p:tav>
-                                        <p:tav tm="100000">
-                                          <p:val>
-                                            <p:strVal val="#ppt_y"/>
-                                          </p:val>
-                                        </p:tav>
-                                      </p:tavLst>
-                                    </p:anim>
-                                  </p:childTnLst>
-                                </p:cTn>
-                              </p:par>
-                            </p:childTnLst>
-                          </p:cTn>
-                        </p:par>
-                      </p:childTnLst>
-                    </p:cTn>
-                  </p:par>
-                  <p:par>
-                    <p:cTn id="9" fill="hold">
-                      <p:stCondLst>
-                        <p:cond delay="indefinite"/>
-                      </p:stCondLst>
-                      <p:childTnLst>
-                        <p:par>
-                          <p:cTn id="10" fill="hold">
-                            <p:stCondLst>
-                              <p:cond delay="0"/>
-                            </p:stCondLst>
-                            <p:childTnLst>
-                              <p:par>
-                                <p:cTn id="11" presetID="2" presetClass="entr" presetSubtype="4" fill="hold" nodeType="clickEffect">
-                                  <p:stCondLst>
-                                    <p:cond delay="0"/>
-                                  </p:stCondLst>
-                                  <p:childTnLst>
-                                    <p:set>
-                                      <p:cBhvr>
-                                        <p:cTn id="12" dur="1" fill="hold">
-                                          <p:stCondLst>
-                                            <p:cond delay="0"/>
-                                          </p:stCondLst>
-                                        </p:cTn>
-                                        <p:tgtEl>
-                                          <p:spTgt spid="6">
-                                            <p:txEl>
-                                              <p:pRg st="0" end="0"/>
-                                            </p:txEl>
-                                          </p:spTgt>
-                                        </p:tgtEl>
-                                        <p:attrNameLst>
-                                          <p:attrName>style.visibility</p:attrName>
-                                        </p:attrNameLst>
-                                      </p:cBhvr>
-                                      <p:to>
-                                        <p:strVal val="visible"/>
-                                      </p:to>
-                                    </p:set>
-                                    <p:anim calcmode="lin" valueType="num">
-                                      <p:cBhvr additive="base">
-                                        <p:cTn id="13" dur="500" fill="hold"/>
-                                        <p:tgtEl>
-                                          <p:spTgt spid="6">
-                                            <p:txEl>
-                                              <p:pRg st="0" end="0"/>
-                                            </p:txEl>
-                                          </p:spTgt>
-                                        </p:tgtEl>
-                                        <p:attrNameLst>
-                                          <p:attrName>ppt_x</p:attrName>
-                                        </p:attrNameLst>
-                                      </p:cBhvr>
-                                      <p:tavLst>
-                                        <p:tav tm="0">
-                                          <p:val>
-                                            <p:strVal val="#ppt_x"/>
-                                          </p:val>
-                                        </p:tav>
-                                        <p:tav tm="100000">
-                                          <p:val>
-                                            <p:strVal val="#ppt_x"/>
-                                          </p:val>
-                                        </p:tav>
-                                      </p:tavLst>
-                                    </p:anim>
-                                    <p:anim calcmode="lin" valueType="num">
-                                      <p:cBhvr additive="base">
-                                        <p:cTn id="14" dur="500" fill="hold"/>
-                                        <p:tgtEl>
-                                          <p:spTgt spid="6">
-                                            <p:txEl>
-                                              <p:pRg st="0" end="0"/>
-                                            </p:txEl>
-                                          </p:spTgt>
-                                        </p:tgtEl>
-                                        <p:attrNameLst>
-                                          <p:attrName>ppt_y</p:attrName>
-                                        </p:attrNameLst>
-                                      </p:cBhvr>
-                                      <p:tavLst>
-                                        <p:tav tm="0">
-                                          <p:val>
-                                            <p:strVal val="1+#ppt_h/2"/>
-                                          </p:val>
-                                        </p:tav>
-                                        <p:tav tm="100000">
-                                          <p:val>
-                                            <p:strVal val="#ppt_y"/>
-                                          </p:val>
-                                        </p:tav>
-                                      </p:tavLst>
-                                    </p:anim>
-                                  </p:childTnLst>
-                                </p:cTn>
-                              </p:par>
-                            </p:childTnLst>
-                          </p:cTn>
-                        </p:par>
-                      </p:childTnLst>
-                    </p:cTn>
-                  </p:par>
-                </p:childTnLst>
-              </p:cTn>
-              <p:prevCondLst>
-                <p:cond evt="onPrev" delay="0">
-                  <p:tgtEl>
-                    <p:sldTgt/>
-                  </p:tgtEl>
-                </p:cond>
-              </p:prevCondLst>
-              <p:nextCondLst>
-                <p:cond evt="onNext" delay="0">
-                  <p:tgtEl>
-                    <p:sldTgt/>
-                  </p:tgtEl>
-                </p:cond>
-              </p:nextCondLst>
-            </p:seq>
-          </p:childTnLst>
-        </p:cTn>
-      </p:par>
-    </p:tnLst>
-    <p:bldLst>
-      <p:bldP spid="4" grpId="0"/>
-    </p:bldLst>
-  </p:timing>
 </p:sld>
 </file>
 

</xml_diff>